<commit_message>
doc: add: assets: xarpite*
</commit_message>
<xml_diff>
--- a/assets/svgs.pptx
+++ b/assets/svgs.pptx
@@ -6,9 +6,11 @@
   </p:sldMasterIdLst>
   <p:sldIdLst>
     <p:sldId id="257" r:id="rId2"/>
-    <p:sldId id="259" r:id="rId3"/>
-    <p:sldId id="258" r:id="rId4"/>
-    <p:sldId id="256" r:id="rId5"/>
+    <p:sldId id="260" r:id="rId3"/>
+    <p:sldId id="259" r:id="rId4"/>
+    <p:sldId id="261" r:id="rId5"/>
+    <p:sldId id="258" r:id="rId6"/>
+    <p:sldId id="256" r:id="rId7"/>
   </p:sldIdLst>
   <p:sldSz cx="8640763" cy="8640763"/>
   <p:notesSz cx="6858000" cy="9144000"/>
@@ -907,6 +909,500 @@
   <p:cSld>
     <p:spTree>
       <p:nvGrpSpPr>
+        <p:cNvPr id="1" name="">
+          <a:extLst>
+            <a:ext uri="{FF2B5EF4-FFF2-40B4-BE49-F238E27FC236}">
+              <a16:creationId xmlns:a16="http://schemas.microsoft.com/office/drawing/2014/main" id="{D013D039-0D2B-9875-AEF6-E740348C8F55}"/>
+            </a:ext>
+          </a:extLst>
+        </p:cNvPr>
+        <p:cNvGrpSpPr/>
+        <p:nvPr/>
+      </p:nvGrpSpPr>
+      <p:grpSpPr>
+        <a:xfrm>
+          <a:off x="0" y="0"/>
+          <a:ext cx="0" cy="0"/>
+          <a:chOff x="0" y="0"/>
+          <a:chExt cx="0" cy="0"/>
+        </a:xfrm>
+      </p:grpSpPr>
+      <p:sp>
+        <p:nvSpPr>
+          <p:cNvPr id="72" name="フリーフォーム: 図形 71">
+            <a:extLst>
+              <a:ext uri="{FF2B5EF4-FFF2-40B4-BE49-F238E27FC236}">
+                <a16:creationId xmlns:a16="http://schemas.microsoft.com/office/drawing/2014/main" id="{0CBBF197-BC02-D4E3-6B66-9B3E65030E36}"/>
+              </a:ext>
+            </a:extLst>
+          </p:cNvPr>
+          <p:cNvSpPr/>
+          <p:nvPr/>
+        </p:nvSpPr>
+        <p:spPr>
+          <a:xfrm>
+            <a:off x="1440381" y="1440381"/>
+            <a:ext cx="5760000" cy="5760000"/>
+          </a:xfrm>
+          <a:custGeom>
+            <a:avLst/>
+            <a:gdLst>
+              <a:gd name="csX0" fmla="*/ 3600000 w 5760000"/>
+              <a:gd name="csY0" fmla="*/ 3240000 h 5760000"/>
+              <a:gd name="csX1" fmla="*/ 4320000 w 5760000"/>
+              <a:gd name="csY1" fmla="*/ 3240000 h 5760000"/>
+              <a:gd name="csX2" fmla="*/ 4320000 w 5760000"/>
+              <a:gd name="csY2" fmla="*/ 3600000 h 5760000"/>
+              <a:gd name="csX3" fmla="*/ 3600000 w 5760000"/>
+              <a:gd name="csY3" fmla="*/ 3600000 h 5760000"/>
+              <a:gd name="csX4" fmla="*/ 1080000 w 5760000"/>
+              <a:gd name="csY4" fmla="*/ 1800000 h 5760000"/>
+              <a:gd name="csX5" fmla="*/ 1080000 w 5760000"/>
+              <a:gd name="csY5" fmla="*/ 2160000 h 5760000"/>
+              <a:gd name="csX6" fmla="*/ 1440000 w 5760000"/>
+              <a:gd name="csY6" fmla="*/ 2160000 h 5760000"/>
+              <a:gd name="csX7" fmla="*/ 1800000 w 5760000"/>
+              <a:gd name="csY7" fmla="*/ 2880000 h 5760000"/>
+              <a:gd name="csX8" fmla="*/ 1440000 w 5760000"/>
+              <a:gd name="csY8" fmla="*/ 3600000 h 5760000"/>
+              <a:gd name="csX9" fmla="*/ 1080000 w 5760000"/>
+              <a:gd name="csY9" fmla="*/ 3600000 h 5760000"/>
+              <a:gd name="csX10" fmla="*/ 1080000 w 5760000"/>
+              <a:gd name="csY10" fmla="*/ 3960000 h 5760000"/>
+              <a:gd name="csX11" fmla="*/ 1620000 w 5760000"/>
+              <a:gd name="csY11" fmla="*/ 3960000 h 5760000"/>
+              <a:gd name="csX12" fmla="*/ 1980000 w 5760000"/>
+              <a:gd name="csY12" fmla="*/ 3240000 h 5760000"/>
+              <a:gd name="csX13" fmla="*/ 2340000 w 5760000"/>
+              <a:gd name="csY13" fmla="*/ 3960000 h 5760000"/>
+              <a:gd name="csX14" fmla="*/ 2880000 w 5760000"/>
+              <a:gd name="csY14" fmla="*/ 3960000 h 5760000"/>
+              <a:gd name="csX15" fmla="*/ 2880000 w 5760000"/>
+              <a:gd name="csY15" fmla="*/ 3600000 h 5760000"/>
+              <a:gd name="csX16" fmla="*/ 2520000 w 5760000"/>
+              <a:gd name="csY16" fmla="*/ 3600000 h 5760000"/>
+              <a:gd name="csX17" fmla="*/ 2160000 w 5760000"/>
+              <a:gd name="csY17" fmla="*/ 2880000 h 5760000"/>
+              <a:gd name="csX18" fmla="*/ 2520000 w 5760000"/>
+              <a:gd name="csY18" fmla="*/ 2160000 h 5760000"/>
+              <a:gd name="csX19" fmla="*/ 2880000 w 5760000"/>
+              <a:gd name="csY19" fmla="*/ 2160000 h 5760000"/>
+              <a:gd name="csX20" fmla="*/ 2880000 w 5760000"/>
+              <a:gd name="csY20" fmla="*/ 1800000 h 5760000"/>
+              <a:gd name="csX21" fmla="*/ 2520000 w 5760000"/>
+              <a:gd name="csY21" fmla="*/ 1800000 h 5760000"/>
+              <a:gd name="csX22" fmla="*/ 2340000 w 5760000"/>
+              <a:gd name="csY22" fmla="*/ 1800000 h 5760000"/>
+              <a:gd name="csX23" fmla="*/ 1980000 w 5760000"/>
+              <a:gd name="csY23" fmla="*/ 2520000 h 5760000"/>
+              <a:gd name="csX24" fmla="*/ 1620000 w 5760000"/>
+              <a:gd name="csY24" fmla="*/ 1800000 h 5760000"/>
+              <a:gd name="csX25" fmla="*/ 2880000 w 5760000"/>
+              <a:gd name="csY25" fmla="*/ 0 h 5760000"/>
+              <a:gd name="csX26" fmla="*/ 5760000 w 5760000"/>
+              <a:gd name="csY26" fmla="*/ 2880000 h 5760000"/>
+              <a:gd name="csX27" fmla="*/ 4680000 w 5760000"/>
+              <a:gd name="csY27" fmla="*/ 3960000 h 5760000"/>
+              <a:gd name="csX28" fmla="*/ 4680000 w 5760000"/>
+              <a:gd name="csY28" fmla="*/ 2340000 h 5760000"/>
+              <a:gd name="csX29" fmla="*/ 4500000 w 5760000"/>
+              <a:gd name="csY29" fmla="*/ 2160000 h 5760000"/>
+              <a:gd name="csX30" fmla="*/ 3240000 w 5760000"/>
+              <a:gd name="csY30" fmla="*/ 2160000 h 5760000"/>
+              <a:gd name="csX31" fmla="*/ 3240000 w 5760000"/>
+              <a:gd name="csY31" fmla="*/ 2520000 h 5760000"/>
+              <a:gd name="csX32" fmla="*/ 4320000 w 5760000"/>
+              <a:gd name="csY32" fmla="*/ 2520000 h 5760000"/>
+              <a:gd name="csX33" fmla="*/ 4320000 w 5760000"/>
+              <a:gd name="csY33" fmla="*/ 2880000 h 5760000"/>
+              <a:gd name="csX34" fmla="*/ 3420000 w 5760000"/>
+              <a:gd name="csY34" fmla="*/ 2880000 h 5760000"/>
+              <a:gd name="csX35" fmla="*/ 3240000 w 5760000"/>
+              <a:gd name="csY35" fmla="*/ 3060000 h 5760000"/>
+              <a:gd name="csX36" fmla="*/ 3240000 w 5760000"/>
+              <a:gd name="csY36" fmla="*/ 3780000 h 5760000"/>
+              <a:gd name="csX37" fmla="*/ 3420000 w 5760000"/>
+              <a:gd name="csY37" fmla="*/ 3960000 h 5760000"/>
+              <a:gd name="csX38" fmla="*/ 4680000 w 5760000"/>
+              <a:gd name="csY38" fmla="*/ 3960000 h 5760000"/>
+              <a:gd name="csX39" fmla="*/ 2880000 w 5760000"/>
+              <a:gd name="csY39" fmla="*/ 5760000 h 5760000"/>
+              <a:gd name="csX40" fmla="*/ 0 w 5760000"/>
+              <a:gd name="csY40" fmla="*/ 2880000 h 5760000"/>
+            </a:gdLst>
+            <a:ahLst/>
+            <a:cxnLst>
+              <a:cxn ang="0">
+                <a:pos x="csX0" y="csY0"/>
+              </a:cxn>
+              <a:cxn ang="0">
+                <a:pos x="csX1" y="csY1"/>
+              </a:cxn>
+              <a:cxn ang="0">
+                <a:pos x="csX2" y="csY2"/>
+              </a:cxn>
+              <a:cxn ang="0">
+                <a:pos x="csX3" y="csY3"/>
+              </a:cxn>
+              <a:cxn ang="0">
+                <a:pos x="csX4" y="csY4"/>
+              </a:cxn>
+              <a:cxn ang="0">
+                <a:pos x="csX5" y="csY5"/>
+              </a:cxn>
+              <a:cxn ang="0">
+                <a:pos x="csX6" y="csY6"/>
+              </a:cxn>
+              <a:cxn ang="0">
+                <a:pos x="csX7" y="csY7"/>
+              </a:cxn>
+              <a:cxn ang="0">
+                <a:pos x="csX8" y="csY8"/>
+              </a:cxn>
+              <a:cxn ang="0">
+                <a:pos x="csX9" y="csY9"/>
+              </a:cxn>
+              <a:cxn ang="0">
+                <a:pos x="csX10" y="csY10"/>
+              </a:cxn>
+              <a:cxn ang="0">
+                <a:pos x="csX11" y="csY11"/>
+              </a:cxn>
+              <a:cxn ang="0">
+                <a:pos x="csX12" y="csY12"/>
+              </a:cxn>
+              <a:cxn ang="0">
+                <a:pos x="csX13" y="csY13"/>
+              </a:cxn>
+              <a:cxn ang="0">
+                <a:pos x="csX14" y="csY14"/>
+              </a:cxn>
+              <a:cxn ang="0">
+                <a:pos x="csX15" y="csY15"/>
+              </a:cxn>
+              <a:cxn ang="0">
+                <a:pos x="csX16" y="csY16"/>
+              </a:cxn>
+              <a:cxn ang="0">
+                <a:pos x="csX17" y="csY17"/>
+              </a:cxn>
+              <a:cxn ang="0">
+                <a:pos x="csX18" y="csY18"/>
+              </a:cxn>
+              <a:cxn ang="0">
+                <a:pos x="csX19" y="csY19"/>
+              </a:cxn>
+              <a:cxn ang="0">
+                <a:pos x="csX20" y="csY20"/>
+              </a:cxn>
+              <a:cxn ang="0">
+                <a:pos x="csX21" y="csY21"/>
+              </a:cxn>
+              <a:cxn ang="0">
+                <a:pos x="csX22" y="csY22"/>
+              </a:cxn>
+              <a:cxn ang="0">
+                <a:pos x="csX23" y="csY23"/>
+              </a:cxn>
+              <a:cxn ang="0">
+                <a:pos x="csX24" y="csY24"/>
+              </a:cxn>
+              <a:cxn ang="0">
+                <a:pos x="csX25" y="csY25"/>
+              </a:cxn>
+              <a:cxn ang="0">
+                <a:pos x="csX26" y="csY26"/>
+              </a:cxn>
+              <a:cxn ang="0">
+                <a:pos x="csX27" y="csY27"/>
+              </a:cxn>
+              <a:cxn ang="0">
+                <a:pos x="csX28" y="csY28"/>
+              </a:cxn>
+              <a:cxn ang="0">
+                <a:pos x="csX29" y="csY29"/>
+              </a:cxn>
+              <a:cxn ang="0">
+                <a:pos x="csX30" y="csY30"/>
+              </a:cxn>
+              <a:cxn ang="0">
+                <a:pos x="csX31" y="csY31"/>
+              </a:cxn>
+              <a:cxn ang="0">
+                <a:pos x="csX32" y="csY32"/>
+              </a:cxn>
+              <a:cxn ang="0">
+                <a:pos x="csX33" y="csY33"/>
+              </a:cxn>
+              <a:cxn ang="0">
+                <a:pos x="csX34" y="csY34"/>
+              </a:cxn>
+              <a:cxn ang="0">
+                <a:pos x="csX35" y="csY35"/>
+              </a:cxn>
+              <a:cxn ang="0">
+                <a:pos x="csX36" y="csY36"/>
+              </a:cxn>
+              <a:cxn ang="0">
+                <a:pos x="csX37" y="csY37"/>
+              </a:cxn>
+              <a:cxn ang="0">
+                <a:pos x="csX38" y="csY38"/>
+              </a:cxn>
+              <a:cxn ang="0">
+                <a:pos x="csX39" y="csY39"/>
+              </a:cxn>
+              <a:cxn ang="0">
+                <a:pos x="csX40" y="csY40"/>
+              </a:cxn>
+            </a:cxnLst>
+            <a:rect l="l" t="t" r="r" b="b"/>
+            <a:pathLst>
+              <a:path w="5760000" h="5760000">
+                <a:moveTo>
+                  <a:pt x="3600000" y="3240000"/>
+                </a:moveTo>
+                <a:lnTo>
+                  <a:pt x="4320000" y="3240000"/>
+                </a:lnTo>
+                <a:lnTo>
+                  <a:pt x="4320000" y="3600000"/>
+                </a:lnTo>
+                <a:lnTo>
+                  <a:pt x="3600000" y="3600000"/>
+                </a:lnTo>
+                <a:close/>
+                <a:moveTo>
+                  <a:pt x="1080000" y="1800000"/>
+                </a:moveTo>
+                <a:lnTo>
+                  <a:pt x="1080000" y="2160000"/>
+                </a:lnTo>
+                <a:lnTo>
+                  <a:pt x="1440000" y="2160000"/>
+                </a:lnTo>
+                <a:lnTo>
+                  <a:pt x="1800000" y="2880000"/>
+                </a:lnTo>
+                <a:lnTo>
+                  <a:pt x="1440000" y="3600000"/>
+                </a:lnTo>
+                <a:lnTo>
+                  <a:pt x="1080000" y="3600000"/>
+                </a:lnTo>
+                <a:lnTo>
+                  <a:pt x="1080000" y="3960000"/>
+                </a:lnTo>
+                <a:lnTo>
+                  <a:pt x="1620000" y="3960000"/>
+                </a:lnTo>
+                <a:lnTo>
+                  <a:pt x="1980000" y="3240000"/>
+                </a:lnTo>
+                <a:lnTo>
+                  <a:pt x="2340000" y="3960000"/>
+                </a:lnTo>
+                <a:lnTo>
+                  <a:pt x="2880000" y="3960000"/>
+                </a:lnTo>
+                <a:lnTo>
+                  <a:pt x="2880000" y="3600000"/>
+                </a:lnTo>
+                <a:lnTo>
+                  <a:pt x="2520000" y="3600000"/>
+                </a:lnTo>
+                <a:lnTo>
+                  <a:pt x="2160000" y="2880000"/>
+                </a:lnTo>
+                <a:lnTo>
+                  <a:pt x="2520000" y="2160000"/>
+                </a:lnTo>
+                <a:lnTo>
+                  <a:pt x="2880000" y="2160000"/>
+                </a:lnTo>
+                <a:lnTo>
+                  <a:pt x="2880000" y="1800000"/>
+                </a:lnTo>
+                <a:lnTo>
+                  <a:pt x="2520000" y="1800000"/>
+                </a:lnTo>
+                <a:lnTo>
+                  <a:pt x="2340000" y="1800000"/>
+                </a:lnTo>
+                <a:lnTo>
+                  <a:pt x="1980000" y="2520000"/>
+                </a:lnTo>
+                <a:lnTo>
+                  <a:pt x="1620000" y="1800000"/>
+                </a:lnTo>
+                <a:close/>
+                <a:moveTo>
+                  <a:pt x="2880000" y="0"/>
+                </a:moveTo>
+                <a:lnTo>
+                  <a:pt x="5760000" y="2880000"/>
+                </a:lnTo>
+                <a:lnTo>
+                  <a:pt x="4680000" y="3960000"/>
+                </a:lnTo>
+                <a:lnTo>
+                  <a:pt x="4680000" y="2340000"/>
+                </a:lnTo>
+                <a:lnTo>
+                  <a:pt x="4500000" y="2160000"/>
+                </a:lnTo>
+                <a:lnTo>
+                  <a:pt x="3240000" y="2160000"/>
+                </a:lnTo>
+                <a:lnTo>
+                  <a:pt x="3240000" y="2520000"/>
+                </a:lnTo>
+                <a:lnTo>
+                  <a:pt x="4320000" y="2520000"/>
+                </a:lnTo>
+                <a:lnTo>
+                  <a:pt x="4320000" y="2880000"/>
+                </a:lnTo>
+                <a:lnTo>
+                  <a:pt x="3420000" y="2880000"/>
+                </a:lnTo>
+                <a:lnTo>
+                  <a:pt x="3240000" y="3060000"/>
+                </a:lnTo>
+                <a:lnTo>
+                  <a:pt x="3240000" y="3780000"/>
+                </a:lnTo>
+                <a:lnTo>
+                  <a:pt x="3420000" y="3960000"/>
+                </a:lnTo>
+                <a:lnTo>
+                  <a:pt x="4680000" y="3960000"/>
+                </a:lnTo>
+                <a:lnTo>
+                  <a:pt x="2880000" y="5760000"/>
+                </a:lnTo>
+                <a:lnTo>
+                  <a:pt x="0" y="2880000"/>
+                </a:lnTo>
+                <a:close/>
+              </a:path>
+            </a:pathLst>
+          </a:custGeom>
+          <a:gradFill flip="none" rotWithShape="1">
+            <a:gsLst>
+              <a:gs pos="70000">
+                <a:srgbClr val="C00000">
+                  <a:lumMod val="70000"/>
+                </a:srgbClr>
+              </a:gs>
+              <a:gs pos="30000">
+                <a:srgbClr val="FF0000">
+                  <a:lumMod val="90000"/>
+                </a:srgbClr>
+              </a:gs>
+            </a:gsLst>
+            <a:lin ang="2700000" scaled="1"/>
+            <a:tileRect/>
+          </a:gradFill>
+          <a:ln>
+            <a:noFill/>
+          </a:ln>
+        </p:spPr>
+        <p:style>
+          <a:lnRef idx="2">
+            <a:schemeClr val="accent1">
+              <a:shade val="15000"/>
+            </a:schemeClr>
+          </a:lnRef>
+          <a:fillRef idx="1">
+            <a:schemeClr val="accent1"/>
+          </a:fillRef>
+          <a:effectRef idx="0">
+            <a:schemeClr val="accent1"/>
+          </a:effectRef>
+          <a:fontRef idx="minor">
+            <a:schemeClr val="lt1"/>
+          </a:fontRef>
+        </p:style>
+        <p:txBody>
+          <a:bodyPr wrap="square" rtlCol="0" anchor="ctr">
+            <a:noAutofit/>
+          </a:bodyPr>
+          <a:lstStyle/>
+          <a:p>
+            <a:pPr algn="ctr"/>
+            <a:endParaRPr kumimoji="1" lang="ja-JP" altLang="en-US"/>
+          </a:p>
+        </p:txBody>
+      </p:sp>
+      <p:sp>
+        <p:nvSpPr>
+          <p:cNvPr id="3" name="正方形/長方形 2">
+            <a:extLst>
+              <a:ext uri="{FF2B5EF4-FFF2-40B4-BE49-F238E27FC236}">
+                <a16:creationId xmlns:a16="http://schemas.microsoft.com/office/drawing/2014/main" id="{3E60E623-A6DB-5601-1C51-E4F1F1B2E681}"/>
+              </a:ext>
+            </a:extLst>
+          </p:cNvPr>
+          <p:cNvSpPr/>
+          <p:nvPr/>
+        </p:nvSpPr>
+        <p:spPr>
+          <a:xfrm>
+            <a:off x="1440381" y="1440381"/>
+            <a:ext cx="5760000" cy="5760000"/>
+          </a:xfrm>
+          <a:prstGeom prst="rect">
+            <a:avLst/>
+          </a:prstGeom>
+          <a:noFill/>
+          <a:ln>
+            <a:noFill/>
+          </a:ln>
+        </p:spPr>
+        <p:style>
+          <a:lnRef idx="2">
+            <a:schemeClr val="accent1">
+              <a:shade val="15000"/>
+            </a:schemeClr>
+          </a:lnRef>
+          <a:fillRef idx="1">
+            <a:schemeClr val="accent1"/>
+          </a:fillRef>
+          <a:effectRef idx="0">
+            <a:schemeClr val="accent1"/>
+          </a:effectRef>
+          <a:fontRef idx="minor">
+            <a:schemeClr val="lt1"/>
+          </a:fontRef>
+        </p:style>
+        <p:txBody>
+          <a:bodyPr rtlCol="0" anchor="ctr"/>
+          <a:lstStyle/>
+          <a:p>
+            <a:pPr algn="ctr"/>
+            <a:endParaRPr kumimoji="1" lang="ja-JP" altLang="en-US"/>
+          </a:p>
+        </p:txBody>
+      </p:sp>
+    </p:spTree>
+    <p:extLst>
+      <p:ext uri="{BB962C8B-B14F-4D97-AF65-F5344CB8AC3E}">
+        <p14:creationId xmlns:p14="http://schemas.microsoft.com/office/powerpoint/2010/main" val="3993219678"/>
+      </p:ext>
+    </p:extLst>
+  </p:cSld>
+  <p:clrMapOvr>
+    <a:masterClrMapping/>
+  </p:clrMapOvr>
+</p:sld>
+</file>
+
+<file path=ppt/slides/slide3.xml><?xml version="1.0" encoding="utf-8"?>
+<p:sld xmlns:a="http://schemas.openxmlformats.org/drawingml/2006/main" xmlns:r="http://schemas.openxmlformats.org/officeDocument/2006/relationships" xmlns:p="http://schemas.openxmlformats.org/presentationml/2006/main">
+  <p:cSld>
+    <p:spTree>
+      <p:nvGrpSpPr>
         <p:cNvPr id="1" name=""/>
         <p:cNvGrpSpPr/>
         <p:nvPr/>
@@ -1137,13 +1633,15 @@
           <a:p>
             <a:r>
               <a:rPr kumimoji="1" lang="en-US" altLang="ja-JP" sz="7500" dirty="0">
-                <a:latin typeface="Monaspace Krypton Var" panose="02000009000000000000" pitchFamily="50" charset="0"/>
-                <a:ea typeface="Monaspace Krypton Var" panose="02000009000000000000" pitchFamily="50" charset="0"/>
+                <a:latin typeface="Monaspace Krypton" panose="02000009000000000000" pitchFamily="49" charset="0"/>
+                <a:ea typeface="Monaspace Krypton" panose="02000009000000000000" pitchFamily="49" charset="0"/>
+                <a:cs typeface="Monaspace Krypton" panose="02000009000000000000" pitchFamily="49" charset="0"/>
               </a:rPr>
               <a:t>fluorite12</a:t>
             </a:r>
             <a:endParaRPr kumimoji="1" lang="ja-JP" altLang="en-US" sz="7500" dirty="0">
-              <a:latin typeface="Monaspace Krypton Var" panose="02000009000000000000" pitchFamily="50" charset="0"/>
+              <a:latin typeface="Monaspace Krypton" panose="02000009000000000000" pitchFamily="49" charset="0"/>
+              <a:cs typeface="Monaspace Krypton" panose="02000009000000000000" pitchFamily="49" charset="0"/>
             </a:endParaRPr>
           </a:p>
         </p:txBody>
@@ -3759,7 +4257,1838 @@
 </p:sld>
 </file>
 
-<file path=ppt/slides/slide3.xml><?xml version="1.0" encoding="utf-8"?>
+<file path=ppt/slides/slide4.xml><?xml version="1.0" encoding="utf-8"?>
+<p:sld xmlns:a="http://schemas.openxmlformats.org/drawingml/2006/main" xmlns:r="http://schemas.openxmlformats.org/officeDocument/2006/relationships" xmlns:p="http://schemas.openxmlformats.org/presentationml/2006/main">
+  <p:cSld>
+    <p:spTree>
+      <p:nvGrpSpPr>
+        <p:cNvPr id="1" name="">
+          <a:extLst>
+            <a:ext uri="{FF2B5EF4-FFF2-40B4-BE49-F238E27FC236}">
+              <a16:creationId xmlns:a16="http://schemas.microsoft.com/office/drawing/2014/main" id="{9EE98669-E17A-4F8A-C3F5-77274E443970}"/>
+            </a:ext>
+          </a:extLst>
+        </p:cNvPr>
+        <p:cNvGrpSpPr/>
+        <p:nvPr/>
+      </p:nvGrpSpPr>
+      <p:grpSpPr>
+        <a:xfrm>
+          <a:off x="0" y="0"/>
+          <a:ext cx="0" cy="0"/>
+          <a:chOff x="0" y="0"/>
+          <a:chExt cx="0" cy="0"/>
+        </a:xfrm>
+      </p:grpSpPr>
+      <p:sp>
+        <p:nvSpPr>
+          <p:cNvPr id="3" name="テキスト ボックス 2">
+            <a:extLst>
+              <a:ext uri="{FF2B5EF4-FFF2-40B4-BE49-F238E27FC236}">
+                <a16:creationId xmlns:a16="http://schemas.microsoft.com/office/drawing/2014/main" id="{3792A2E6-9FA5-1DFF-7D80-45CD818341EF}"/>
+              </a:ext>
+            </a:extLst>
+          </p:cNvPr>
+          <p:cNvSpPr txBox="1"/>
+          <p:nvPr/>
+        </p:nvSpPr>
+        <p:spPr>
+          <a:xfrm>
+            <a:off x="2160381" y="1440381"/>
+            <a:ext cx="4500000" cy="1440000"/>
+          </a:xfrm>
+          <a:prstGeom prst="rect">
+            <a:avLst/>
+          </a:prstGeom>
+          <a:noFill/>
+        </p:spPr>
+        <p:txBody>
+          <a:bodyPr wrap="square" lIns="108000" tIns="144000" rIns="0" bIns="0" rtlCol="0">
+            <a:noAutofit/>
+          </a:bodyPr>
+          <a:lstStyle/>
+          <a:p>
+            <a:r>
+              <a:rPr kumimoji="1" lang="en-US" altLang="ja-JP" sz="7800" dirty="0" err="1">
+                <a:latin typeface="Monaspace Krypton" panose="02000009000000000000" pitchFamily="49" charset="0"/>
+                <a:ea typeface="Monaspace Krypton" panose="02000009000000000000" pitchFamily="49" charset="0"/>
+                <a:cs typeface="Monaspace Krypton" panose="02000009000000000000" pitchFamily="49" charset="0"/>
+              </a:rPr>
+              <a:t>Xarpite</a:t>
+            </a:r>
+            <a:endParaRPr kumimoji="1" lang="ja-JP" altLang="en-US" sz="7800" dirty="0">
+              <a:latin typeface="Monaspace Krypton" panose="02000009000000000000" pitchFamily="49" charset="0"/>
+              <a:cs typeface="Monaspace Krypton" panose="02000009000000000000" pitchFamily="49" charset="0"/>
+            </a:endParaRPr>
+          </a:p>
+        </p:txBody>
+      </p:sp>
+      <p:sp>
+        <p:nvSpPr>
+          <p:cNvPr id="4" name="正方形/長方形 3">
+            <a:extLst>
+              <a:ext uri="{FF2B5EF4-FFF2-40B4-BE49-F238E27FC236}">
+                <a16:creationId xmlns:a16="http://schemas.microsoft.com/office/drawing/2014/main" id="{0AA55F4E-3BDD-032A-A5DF-8C89AC7A7BF6}"/>
+              </a:ext>
+            </a:extLst>
+          </p:cNvPr>
+          <p:cNvSpPr/>
+          <p:nvPr/>
+        </p:nvSpPr>
+        <p:spPr>
+          <a:xfrm>
+            <a:off x="720381" y="1440381"/>
+            <a:ext cx="5760000" cy="1440000"/>
+          </a:xfrm>
+          <a:prstGeom prst="rect">
+            <a:avLst/>
+          </a:prstGeom>
+          <a:noFill/>
+          <a:ln>
+            <a:noFill/>
+          </a:ln>
+        </p:spPr>
+        <p:style>
+          <a:lnRef idx="2">
+            <a:schemeClr val="accent1">
+              <a:shade val="15000"/>
+            </a:schemeClr>
+          </a:lnRef>
+          <a:fillRef idx="1">
+            <a:schemeClr val="accent1"/>
+          </a:fillRef>
+          <a:effectRef idx="0">
+            <a:schemeClr val="accent1"/>
+          </a:effectRef>
+          <a:fontRef idx="minor">
+            <a:schemeClr val="lt1"/>
+          </a:fontRef>
+        </p:style>
+        <p:txBody>
+          <a:bodyPr rtlCol="0" anchor="ctr"/>
+          <a:lstStyle/>
+          <a:p>
+            <a:pPr algn="ctr"/>
+            <a:endParaRPr kumimoji="1" lang="ja-JP" altLang="en-US"/>
+          </a:p>
+        </p:txBody>
+      </p:sp>
+      <p:sp>
+        <p:nvSpPr>
+          <p:cNvPr id="11" name="フリーフォーム: 図形 10">
+            <a:extLst>
+              <a:ext uri="{FF2B5EF4-FFF2-40B4-BE49-F238E27FC236}">
+                <a16:creationId xmlns:a16="http://schemas.microsoft.com/office/drawing/2014/main" id="{F542EA46-F771-45C0-3D97-4F3E4577076C}"/>
+              </a:ext>
+            </a:extLst>
+          </p:cNvPr>
+          <p:cNvSpPr/>
+          <p:nvPr/>
+        </p:nvSpPr>
+        <p:spPr>
+          <a:xfrm>
+            <a:off x="540381" y="1260381"/>
+            <a:ext cx="6120000" cy="1800000"/>
+          </a:xfrm>
+          <a:custGeom>
+            <a:avLst/>
+            <a:gdLst>
+              <a:gd name="csX0" fmla="*/ 180000 w 6120000"/>
+              <a:gd name="csY0" fmla="*/ 180000 h 1800000"/>
+              <a:gd name="csX1" fmla="*/ 180000 w 6120000"/>
+              <a:gd name="csY1" fmla="*/ 1620000 h 1800000"/>
+              <a:gd name="csX2" fmla="*/ 5940000 w 6120000"/>
+              <a:gd name="csY2" fmla="*/ 1620000 h 1800000"/>
+              <a:gd name="csX3" fmla="*/ 5940000 w 6120000"/>
+              <a:gd name="csY3" fmla="*/ 180000 h 1800000"/>
+              <a:gd name="csX4" fmla="*/ 0 w 6120000"/>
+              <a:gd name="csY4" fmla="*/ 0 h 1800000"/>
+              <a:gd name="csX5" fmla="*/ 180000 w 6120000"/>
+              <a:gd name="csY5" fmla="*/ 0 h 1800000"/>
+              <a:gd name="csX6" fmla="*/ 6120000 w 6120000"/>
+              <a:gd name="csY6" fmla="*/ 0 h 1800000"/>
+              <a:gd name="csX7" fmla="*/ 6120000 w 6120000"/>
+              <a:gd name="csY7" fmla="*/ 180000 h 1800000"/>
+              <a:gd name="csX8" fmla="*/ 6120000 w 6120000"/>
+              <a:gd name="csY8" fmla="*/ 1620000 h 1800000"/>
+              <a:gd name="csX9" fmla="*/ 6120000 w 6120000"/>
+              <a:gd name="csY9" fmla="*/ 1800000 h 1800000"/>
+              <a:gd name="csX10" fmla="*/ 180000 w 6120000"/>
+              <a:gd name="csY10" fmla="*/ 1800000 h 1800000"/>
+              <a:gd name="csX11" fmla="*/ 0 w 6120000"/>
+              <a:gd name="csY11" fmla="*/ 1800000 h 1800000"/>
+              <a:gd name="csX0" fmla="*/ 180000 w 6120000"/>
+              <a:gd name="csY0" fmla="*/ 180000 h 1800000"/>
+              <a:gd name="csX1" fmla="*/ 180000 w 6120000"/>
+              <a:gd name="csY1" fmla="*/ 1620000 h 1800000"/>
+              <a:gd name="csX2" fmla="*/ 5940000 w 6120000"/>
+              <a:gd name="csY2" fmla="*/ 1620000 h 1800000"/>
+              <a:gd name="csX3" fmla="*/ 5940000 w 6120000"/>
+              <a:gd name="csY3" fmla="*/ 180000 h 1800000"/>
+              <a:gd name="csX4" fmla="*/ 180000 w 6120000"/>
+              <a:gd name="csY4" fmla="*/ 180000 h 1800000"/>
+              <a:gd name="csX5" fmla="*/ 0 w 6120000"/>
+              <a:gd name="csY5" fmla="*/ 0 h 1800000"/>
+              <a:gd name="csX6" fmla="*/ 180000 w 6120000"/>
+              <a:gd name="csY6" fmla="*/ 0 h 1800000"/>
+              <a:gd name="csX7" fmla="*/ 6120000 w 6120000"/>
+              <a:gd name="csY7" fmla="*/ 0 h 1800000"/>
+              <a:gd name="csX8" fmla="*/ 6120000 w 6120000"/>
+              <a:gd name="csY8" fmla="*/ 1620000 h 1800000"/>
+              <a:gd name="csX9" fmla="*/ 6120000 w 6120000"/>
+              <a:gd name="csY9" fmla="*/ 1800000 h 1800000"/>
+              <a:gd name="csX10" fmla="*/ 180000 w 6120000"/>
+              <a:gd name="csY10" fmla="*/ 1800000 h 1800000"/>
+              <a:gd name="csX11" fmla="*/ 0 w 6120000"/>
+              <a:gd name="csY11" fmla="*/ 1800000 h 1800000"/>
+              <a:gd name="csX12" fmla="*/ 0 w 6120000"/>
+              <a:gd name="csY12" fmla="*/ 0 h 1800000"/>
+              <a:gd name="csX0" fmla="*/ 180000 w 6120000"/>
+              <a:gd name="csY0" fmla="*/ 180000 h 1800000"/>
+              <a:gd name="csX1" fmla="*/ 180000 w 6120000"/>
+              <a:gd name="csY1" fmla="*/ 1620000 h 1800000"/>
+              <a:gd name="csX2" fmla="*/ 5940000 w 6120000"/>
+              <a:gd name="csY2" fmla="*/ 1620000 h 1800000"/>
+              <a:gd name="csX3" fmla="*/ 5940000 w 6120000"/>
+              <a:gd name="csY3" fmla="*/ 180000 h 1800000"/>
+              <a:gd name="csX4" fmla="*/ 180000 w 6120000"/>
+              <a:gd name="csY4" fmla="*/ 180000 h 1800000"/>
+              <a:gd name="csX5" fmla="*/ 0 w 6120000"/>
+              <a:gd name="csY5" fmla="*/ 0 h 1800000"/>
+              <a:gd name="csX6" fmla="*/ 180000 w 6120000"/>
+              <a:gd name="csY6" fmla="*/ 0 h 1800000"/>
+              <a:gd name="csX7" fmla="*/ 6120000 w 6120000"/>
+              <a:gd name="csY7" fmla="*/ 0 h 1800000"/>
+              <a:gd name="csX8" fmla="*/ 6120000 w 6120000"/>
+              <a:gd name="csY8" fmla="*/ 1800000 h 1800000"/>
+              <a:gd name="csX9" fmla="*/ 180000 w 6120000"/>
+              <a:gd name="csY9" fmla="*/ 1800000 h 1800000"/>
+              <a:gd name="csX10" fmla="*/ 0 w 6120000"/>
+              <a:gd name="csY10" fmla="*/ 1800000 h 1800000"/>
+              <a:gd name="csX11" fmla="*/ 0 w 6120000"/>
+              <a:gd name="csY11" fmla="*/ 0 h 1800000"/>
+            </a:gdLst>
+            <a:ahLst/>
+            <a:cxnLst>
+              <a:cxn ang="0">
+                <a:pos x="csX0" y="csY0"/>
+              </a:cxn>
+              <a:cxn ang="0">
+                <a:pos x="csX1" y="csY1"/>
+              </a:cxn>
+              <a:cxn ang="0">
+                <a:pos x="csX2" y="csY2"/>
+              </a:cxn>
+              <a:cxn ang="0">
+                <a:pos x="csX3" y="csY3"/>
+              </a:cxn>
+              <a:cxn ang="0">
+                <a:pos x="csX4" y="csY4"/>
+              </a:cxn>
+              <a:cxn ang="0">
+                <a:pos x="csX5" y="csY5"/>
+              </a:cxn>
+              <a:cxn ang="0">
+                <a:pos x="csX6" y="csY6"/>
+              </a:cxn>
+              <a:cxn ang="0">
+                <a:pos x="csX7" y="csY7"/>
+              </a:cxn>
+              <a:cxn ang="0">
+                <a:pos x="csX8" y="csY8"/>
+              </a:cxn>
+              <a:cxn ang="0">
+                <a:pos x="csX9" y="csY9"/>
+              </a:cxn>
+              <a:cxn ang="0">
+                <a:pos x="csX10" y="csY10"/>
+              </a:cxn>
+              <a:cxn ang="0">
+                <a:pos x="csX11" y="csY11"/>
+              </a:cxn>
+            </a:cxnLst>
+            <a:rect l="l" t="t" r="r" b="b"/>
+            <a:pathLst>
+              <a:path w="6120000" h="1800000">
+                <a:moveTo>
+                  <a:pt x="180000" y="180000"/>
+                </a:moveTo>
+                <a:lnTo>
+                  <a:pt x="180000" y="1620000"/>
+                </a:lnTo>
+                <a:lnTo>
+                  <a:pt x="5940000" y="1620000"/>
+                </a:lnTo>
+                <a:lnTo>
+                  <a:pt x="5940000" y="180000"/>
+                </a:lnTo>
+                <a:lnTo>
+                  <a:pt x="180000" y="180000"/>
+                </a:lnTo>
+                <a:close/>
+                <a:moveTo>
+                  <a:pt x="0" y="0"/>
+                </a:moveTo>
+                <a:lnTo>
+                  <a:pt x="180000" y="0"/>
+                </a:lnTo>
+                <a:lnTo>
+                  <a:pt x="6120000" y="0"/>
+                </a:lnTo>
+                <a:lnTo>
+                  <a:pt x="6120000" y="1800000"/>
+                </a:lnTo>
+                <a:lnTo>
+                  <a:pt x="180000" y="1800000"/>
+                </a:lnTo>
+                <a:lnTo>
+                  <a:pt x="0" y="1800000"/>
+                </a:lnTo>
+                <a:lnTo>
+                  <a:pt x="0" y="0"/>
+                </a:lnTo>
+                <a:close/>
+              </a:path>
+            </a:pathLst>
+          </a:custGeom>
+          <a:solidFill>
+            <a:schemeClr val="bg1">
+              <a:lumMod val="65000"/>
+            </a:schemeClr>
+          </a:solidFill>
+          <a:ln>
+            <a:noFill/>
+          </a:ln>
+        </p:spPr>
+        <p:style>
+          <a:lnRef idx="2">
+            <a:schemeClr val="accent1">
+              <a:shade val="15000"/>
+            </a:schemeClr>
+          </a:lnRef>
+          <a:fillRef idx="1">
+            <a:schemeClr val="accent1"/>
+          </a:fillRef>
+          <a:effectRef idx="0">
+            <a:schemeClr val="accent1"/>
+          </a:effectRef>
+          <a:fontRef idx="minor">
+            <a:schemeClr val="lt1"/>
+          </a:fontRef>
+        </p:style>
+        <p:txBody>
+          <a:bodyPr wrap="square" rtlCol="0" anchor="ctr">
+            <a:noAutofit/>
+          </a:bodyPr>
+          <a:lstStyle/>
+          <a:p>
+            <a:pPr algn="ctr"/>
+            <a:endParaRPr kumimoji="1" lang="ja-JP" altLang="en-US" sz="2592"/>
+          </a:p>
+        </p:txBody>
+      </p:sp>
+      <p:sp>
+        <p:nvSpPr>
+          <p:cNvPr id="5" name="フリーフォーム: 図形 4">
+            <a:extLst>
+              <a:ext uri="{FF2B5EF4-FFF2-40B4-BE49-F238E27FC236}">
+                <a16:creationId xmlns:a16="http://schemas.microsoft.com/office/drawing/2014/main" id="{54F92817-44EA-EE7E-7EEF-F694D5F28DA2}"/>
+              </a:ext>
+            </a:extLst>
+          </p:cNvPr>
+          <p:cNvSpPr/>
+          <p:nvPr/>
+        </p:nvSpPr>
+        <p:spPr>
+          <a:xfrm>
+            <a:off x="720381" y="1440381"/>
+            <a:ext cx="1440000" cy="1440000"/>
+          </a:xfrm>
+          <a:custGeom>
+            <a:avLst/>
+            <a:gdLst>
+              <a:gd name="csX0" fmla="*/ 3600000 w 5760000"/>
+              <a:gd name="csY0" fmla="*/ 3240000 h 5760000"/>
+              <a:gd name="csX1" fmla="*/ 4320000 w 5760000"/>
+              <a:gd name="csY1" fmla="*/ 3240000 h 5760000"/>
+              <a:gd name="csX2" fmla="*/ 4320000 w 5760000"/>
+              <a:gd name="csY2" fmla="*/ 3600000 h 5760000"/>
+              <a:gd name="csX3" fmla="*/ 3600000 w 5760000"/>
+              <a:gd name="csY3" fmla="*/ 3600000 h 5760000"/>
+              <a:gd name="csX4" fmla="*/ 1080000 w 5760000"/>
+              <a:gd name="csY4" fmla="*/ 1800000 h 5760000"/>
+              <a:gd name="csX5" fmla="*/ 1080000 w 5760000"/>
+              <a:gd name="csY5" fmla="*/ 2160000 h 5760000"/>
+              <a:gd name="csX6" fmla="*/ 1440000 w 5760000"/>
+              <a:gd name="csY6" fmla="*/ 2160000 h 5760000"/>
+              <a:gd name="csX7" fmla="*/ 1800000 w 5760000"/>
+              <a:gd name="csY7" fmla="*/ 2880000 h 5760000"/>
+              <a:gd name="csX8" fmla="*/ 1440000 w 5760000"/>
+              <a:gd name="csY8" fmla="*/ 3600000 h 5760000"/>
+              <a:gd name="csX9" fmla="*/ 1080000 w 5760000"/>
+              <a:gd name="csY9" fmla="*/ 3600000 h 5760000"/>
+              <a:gd name="csX10" fmla="*/ 1080000 w 5760000"/>
+              <a:gd name="csY10" fmla="*/ 3960000 h 5760000"/>
+              <a:gd name="csX11" fmla="*/ 1620000 w 5760000"/>
+              <a:gd name="csY11" fmla="*/ 3960000 h 5760000"/>
+              <a:gd name="csX12" fmla="*/ 1980000 w 5760000"/>
+              <a:gd name="csY12" fmla="*/ 3240000 h 5760000"/>
+              <a:gd name="csX13" fmla="*/ 2340000 w 5760000"/>
+              <a:gd name="csY13" fmla="*/ 3960000 h 5760000"/>
+              <a:gd name="csX14" fmla="*/ 2880000 w 5760000"/>
+              <a:gd name="csY14" fmla="*/ 3960000 h 5760000"/>
+              <a:gd name="csX15" fmla="*/ 2880000 w 5760000"/>
+              <a:gd name="csY15" fmla="*/ 3600000 h 5760000"/>
+              <a:gd name="csX16" fmla="*/ 2520000 w 5760000"/>
+              <a:gd name="csY16" fmla="*/ 3600000 h 5760000"/>
+              <a:gd name="csX17" fmla="*/ 2160000 w 5760000"/>
+              <a:gd name="csY17" fmla="*/ 2880000 h 5760000"/>
+              <a:gd name="csX18" fmla="*/ 2520000 w 5760000"/>
+              <a:gd name="csY18" fmla="*/ 2160000 h 5760000"/>
+              <a:gd name="csX19" fmla="*/ 2880000 w 5760000"/>
+              <a:gd name="csY19" fmla="*/ 2160000 h 5760000"/>
+              <a:gd name="csX20" fmla="*/ 2880000 w 5760000"/>
+              <a:gd name="csY20" fmla="*/ 1800000 h 5760000"/>
+              <a:gd name="csX21" fmla="*/ 2520000 w 5760000"/>
+              <a:gd name="csY21" fmla="*/ 1800000 h 5760000"/>
+              <a:gd name="csX22" fmla="*/ 2340000 w 5760000"/>
+              <a:gd name="csY22" fmla="*/ 1800000 h 5760000"/>
+              <a:gd name="csX23" fmla="*/ 1980000 w 5760000"/>
+              <a:gd name="csY23" fmla="*/ 2520000 h 5760000"/>
+              <a:gd name="csX24" fmla="*/ 1620000 w 5760000"/>
+              <a:gd name="csY24" fmla="*/ 1800000 h 5760000"/>
+              <a:gd name="csX25" fmla="*/ 2880000 w 5760000"/>
+              <a:gd name="csY25" fmla="*/ 0 h 5760000"/>
+              <a:gd name="csX26" fmla="*/ 5760000 w 5760000"/>
+              <a:gd name="csY26" fmla="*/ 2880000 h 5760000"/>
+              <a:gd name="csX27" fmla="*/ 4680000 w 5760000"/>
+              <a:gd name="csY27" fmla="*/ 3960000 h 5760000"/>
+              <a:gd name="csX28" fmla="*/ 4680000 w 5760000"/>
+              <a:gd name="csY28" fmla="*/ 2340000 h 5760000"/>
+              <a:gd name="csX29" fmla="*/ 4500000 w 5760000"/>
+              <a:gd name="csY29" fmla="*/ 2160000 h 5760000"/>
+              <a:gd name="csX30" fmla="*/ 3240000 w 5760000"/>
+              <a:gd name="csY30" fmla="*/ 2160000 h 5760000"/>
+              <a:gd name="csX31" fmla="*/ 3240000 w 5760000"/>
+              <a:gd name="csY31" fmla="*/ 2520000 h 5760000"/>
+              <a:gd name="csX32" fmla="*/ 4320000 w 5760000"/>
+              <a:gd name="csY32" fmla="*/ 2520000 h 5760000"/>
+              <a:gd name="csX33" fmla="*/ 4320000 w 5760000"/>
+              <a:gd name="csY33" fmla="*/ 2880000 h 5760000"/>
+              <a:gd name="csX34" fmla="*/ 3420000 w 5760000"/>
+              <a:gd name="csY34" fmla="*/ 2880000 h 5760000"/>
+              <a:gd name="csX35" fmla="*/ 3240000 w 5760000"/>
+              <a:gd name="csY35" fmla="*/ 3060000 h 5760000"/>
+              <a:gd name="csX36" fmla="*/ 3240000 w 5760000"/>
+              <a:gd name="csY36" fmla="*/ 3780000 h 5760000"/>
+              <a:gd name="csX37" fmla="*/ 3420000 w 5760000"/>
+              <a:gd name="csY37" fmla="*/ 3960000 h 5760000"/>
+              <a:gd name="csX38" fmla="*/ 4680000 w 5760000"/>
+              <a:gd name="csY38" fmla="*/ 3960000 h 5760000"/>
+              <a:gd name="csX39" fmla="*/ 2880000 w 5760000"/>
+              <a:gd name="csY39" fmla="*/ 5760000 h 5760000"/>
+              <a:gd name="csX40" fmla="*/ 0 w 5760000"/>
+              <a:gd name="csY40" fmla="*/ 2880000 h 5760000"/>
+            </a:gdLst>
+            <a:ahLst/>
+            <a:cxnLst>
+              <a:cxn ang="0">
+                <a:pos x="csX0" y="csY0"/>
+              </a:cxn>
+              <a:cxn ang="0">
+                <a:pos x="csX1" y="csY1"/>
+              </a:cxn>
+              <a:cxn ang="0">
+                <a:pos x="csX2" y="csY2"/>
+              </a:cxn>
+              <a:cxn ang="0">
+                <a:pos x="csX3" y="csY3"/>
+              </a:cxn>
+              <a:cxn ang="0">
+                <a:pos x="csX4" y="csY4"/>
+              </a:cxn>
+              <a:cxn ang="0">
+                <a:pos x="csX5" y="csY5"/>
+              </a:cxn>
+              <a:cxn ang="0">
+                <a:pos x="csX6" y="csY6"/>
+              </a:cxn>
+              <a:cxn ang="0">
+                <a:pos x="csX7" y="csY7"/>
+              </a:cxn>
+              <a:cxn ang="0">
+                <a:pos x="csX8" y="csY8"/>
+              </a:cxn>
+              <a:cxn ang="0">
+                <a:pos x="csX9" y="csY9"/>
+              </a:cxn>
+              <a:cxn ang="0">
+                <a:pos x="csX10" y="csY10"/>
+              </a:cxn>
+              <a:cxn ang="0">
+                <a:pos x="csX11" y="csY11"/>
+              </a:cxn>
+              <a:cxn ang="0">
+                <a:pos x="csX12" y="csY12"/>
+              </a:cxn>
+              <a:cxn ang="0">
+                <a:pos x="csX13" y="csY13"/>
+              </a:cxn>
+              <a:cxn ang="0">
+                <a:pos x="csX14" y="csY14"/>
+              </a:cxn>
+              <a:cxn ang="0">
+                <a:pos x="csX15" y="csY15"/>
+              </a:cxn>
+              <a:cxn ang="0">
+                <a:pos x="csX16" y="csY16"/>
+              </a:cxn>
+              <a:cxn ang="0">
+                <a:pos x="csX17" y="csY17"/>
+              </a:cxn>
+              <a:cxn ang="0">
+                <a:pos x="csX18" y="csY18"/>
+              </a:cxn>
+              <a:cxn ang="0">
+                <a:pos x="csX19" y="csY19"/>
+              </a:cxn>
+              <a:cxn ang="0">
+                <a:pos x="csX20" y="csY20"/>
+              </a:cxn>
+              <a:cxn ang="0">
+                <a:pos x="csX21" y="csY21"/>
+              </a:cxn>
+              <a:cxn ang="0">
+                <a:pos x="csX22" y="csY22"/>
+              </a:cxn>
+              <a:cxn ang="0">
+                <a:pos x="csX23" y="csY23"/>
+              </a:cxn>
+              <a:cxn ang="0">
+                <a:pos x="csX24" y="csY24"/>
+              </a:cxn>
+              <a:cxn ang="0">
+                <a:pos x="csX25" y="csY25"/>
+              </a:cxn>
+              <a:cxn ang="0">
+                <a:pos x="csX26" y="csY26"/>
+              </a:cxn>
+              <a:cxn ang="0">
+                <a:pos x="csX27" y="csY27"/>
+              </a:cxn>
+              <a:cxn ang="0">
+                <a:pos x="csX28" y="csY28"/>
+              </a:cxn>
+              <a:cxn ang="0">
+                <a:pos x="csX29" y="csY29"/>
+              </a:cxn>
+              <a:cxn ang="0">
+                <a:pos x="csX30" y="csY30"/>
+              </a:cxn>
+              <a:cxn ang="0">
+                <a:pos x="csX31" y="csY31"/>
+              </a:cxn>
+              <a:cxn ang="0">
+                <a:pos x="csX32" y="csY32"/>
+              </a:cxn>
+              <a:cxn ang="0">
+                <a:pos x="csX33" y="csY33"/>
+              </a:cxn>
+              <a:cxn ang="0">
+                <a:pos x="csX34" y="csY34"/>
+              </a:cxn>
+              <a:cxn ang="0">
+                <a:pos x="csX35" y="csY35"/>
+              </a:cxn>
+              <a:cxn ang="0">
+                <a:pos x="csX36" y="csY36"/>
+              </a:cxn>
+              <a:cxn ang="0">
+                <a:pos x="csX37" y="csY37"/>
+              </a:cxn>
+              <a:cxn ang="0">
+                <a:pos x="csX38" y="csY38"/>
+              </a:cxn>
+              <a:cxn ang="0">
+                <a:pos x="csX39" y="csY39"/>
+              </a:cxn>
+              <a:cxn ang="0">
+                <a:pos x="csX40" y="csY40"/>
+              </a:cxn>
+            </a:cxnLst>
+            <a:rect l="l" t="t" r="r" b="b"/>
+            <a:pathLst>
+              <a:path w="5760000" h="5760000">
+                <a:moveTo>
+                  <a:pt x="3600000" y="3240000"/>
+                </a:moveTo>
+                <a:lnTo>
+                  <a:pt x="4320000" y="3240000"/>
+                </a:lnTo>
+                <a:lnTo>
+                  <a:pt x="4320000" y="3600000"/>
+                </a:lnTo>
+                <a:lnTo>
+                  <a:pt x="3600000" y="3600000"/>
+                </a:lnTo>
+                <a:close/>
+                <a:moveTo>
+                  <a:pt x="1080000" y="1800000"/>
+                </a:moveTo>
+                <a:lnTo>
+                  <a:pt x="1080000" y="2160000"/>
+                </a:lnTo>
+                <a:lnTo>
+                  <a:pt x="1440000" y="2160000"/>
+                </a:lnTo>
+                <a:lnTo>
+                  <a:pt x="1800000" y="2880000"/>
+                </a:lnTo>
+                <a:lnTo>
+                  <a:pt x="1440000" y="3600000"/>
+                </a:lnTo>
+                <a:lnTo>
+                  <a:pt x="1080000" y="3600000"/>
+                </a:lnTo>
+                <a:lnTo>
+                  <a:pt x="1080000" y="3960000"/>
+                </a:lnTo>
+                <a:lnTo>
+                  <a:pt x="1620000" y="3960000"/>
+                </a:lnTo>
+                <a:lnTo>
+                  <a:pt x="1980000" y="3240000"/>
+                </a:lnTo>
+                <a:lnTo>
+                  <a:pt x="2340000" y="3960000"/>
+                </a:lnTo>
+                <a:lnTo>
+                  <a:pt x="2880000" y="3960000"/>
+                </a:lnTo>
+                <a:lnTo>
+                  <a:pt x="2880000" y="3600000"/>
+                </a:lnTo>
+                <a:lnTo>
+                  <a:pt x="2520000" y="3600000"/>
+                </a:lnTo>
+                <a:lnTo>
+                  <a:pt x="2160000" y="2880000"/>
+                </a:lnTo>
+                <a:lnTo>
+                  <a:pt x="2520000" y="2160000"/>
+                </a:lnTo>
+                <a:lnTo>
+                  <a:pt x="2880000" y="2160000"/>
+                </a:lnTo>
+                <a:lnTo>
+                  <a:pt x="2880000" y="1800000"/>
+                </a:lnTo>
+                <a:lnTo>
+                  <a:pt x="2520000" y="1800000"/>
+                </a:lnTo>
+                <a:lnTo>
+                  <a:pt x="2340000" y="1800000"/>
+                </a:lnTo>
+                <a:lnTo>
+                  <a:pt x="1980000" y="2520000"/>
+                </a:lnTo>
+                <a:lnTo>
+                  <a:pt x="1620000" y="1800000"/>
+                </a:lnTo>
+                <a:close/>
+                <a:moveTo>
+                  <a:pt x="2880000" y="0"/>
+                </a:moveTo>
+                <a:lnTo>
+                  <a:pt x="5760000" y="2880000"/>
+                </a:lnTo>
+                <a:lnTo>
+                  <a:pt x="4680000" y="3960000"/>
+                </a:lnTo>
+                <a:lnTo>
+                  <a:pt x="4680000" y="2340000"/>
+                </a:lnTo>
+                <a:lnTo>
+                  <a:pt x="4500000" y="2160000"/>
+                </a:lnTo>
+                <a:lnTo>
+                  <a:pt x="3240000" y="2160000"/>
+                </a:lnTo>
+                <a:lnTo>
+                  <a:pt x="3240000" y="2520000"/>
+                </a:lnTo>
+                <a:lnTo>
+                  <a:pt x="4320000" y="2520000"/>
+                </a:lnTo>
+                <a:lnTo>
+                  <a:pt x="4320000" y="2880000"/>
+                </a:lnTo>
+                <a:lnTo>
+                  <a:pt x="3420000" y="2880000"/>
+                </a:lnTo>
+                <a:lnTo>
+                  <a:pt x="3240000" y="3060000"/>
+                </a:lnTo>
+                <a:lnTo>
+                  <a:pt x="3240000" y="3780000"/>
+                </a:lnTo>
+                <a:lnTo>
+                  <a:pt x="3420000" y="3960000"/>
+                </a:lnTo>
+                <a:lnTo>
+                  <a:pt x="4680000" y="3960000"/>
+                </a:lnTo>
+                <a:lnTo>
+                  <a:pt x="2880000" y="5760000"/>
+                </a:lnTo>
+                <a:lnTo>
+                  <a:pt x="0" y="2880000"/>
+                </a:lnTo>
+                <a:close/>
+              </a:path>
+            </a:pathLst>
+          </a:custGeom>
+          <a:gradFill flip="none" rotWithShape="1">
+            <a:gsLst>
+              <a:gs pos="70000">
+                <a:srgbClr val="C00000">
+                  <a:lumMod val="70000"/>
+                </a:srgbClr>
+              </a:gs>
+              <a:gs pos="30000">
+                <a:srgbClr val="FF0000">
+                  <a:lumMod val="90000"/>
+                </a:srgbClr>
+              </a:gs>
+            </a:gsLst>
+            <a:lin ang="2700000" scaled="1"/>
+            <a:tileRect/>
+          </a:gradFill>
+          <a:ln>
+            <a:noFill/>
+          </a:ln>
+        </p:spPr>
+        <p:style>
+          <a:lnRef idx="2">
+            <a:schemeClr val="accent1">
+              <a:shade val="15000"/>
+            </a:schemeClr>
+          </a:lnRef>
+          <a:fillRef idx="1">
+            <a:schemeClr val="accent1"/>
+          </a:fillRef>
+          <a:effectRef idx="0">
+            <a:schemeClr val="accent1"/>
+          </a:effectRef>
+          <a:fontRef idx="minor">
+            <a:schemeClr val="lt1"/>
+          </a:fontRef>
+        </p:style>
+        <p:txBody>
+          <a:bodyPr wrap="square" rtlCol="0" anchor="ctr">
+            <a:noAutofit/>
+          </a:bodyPr>
+          <a:lstStyle/>
+          <a:p>
+            <a:pPr algn="ctr"/>
+            <a:endParaRPr kumimoji="1" lang="ja-JP" altLang="en-US"/>
+          </a:p>
+        </p:txBody>
+      </p:sp>
+      <p:sp>
+        <p:nvSpPr>
+          <p:cNvPr id="16" name="フリーフォーム: 図形 15">
+            <a:extLst>
+              <a:ext uri="{FF2B5EF4-FFF2-40B4-BE49-F238E27FC236}">
+                <a16:creationId xmlns:a16="http://schemas.microsoft.com/office/drawing/2014/main" id="{52F11603-35AE-15AD-573E-74944C11DDB6}"/>
+              </a:ext>
+            </a:extLst>
+          </p:cNvPr>
+          <p:cNvSpPr/>
+          <p:nvPr/>
+        </p:nvSpPr>
+        <p:spPr>
+          <a:xfrm>
+            <a:off x="540381" y="3420381"/>
+            <a:ext cx="6120000" cy="1800000"/>
+          </a:xfrm>
+          <a:custGeom>
+            <a:avLst/>
+            <a:gdLst>
+              <a:gd name="csX0" fmla="*/ 180000 w 6120000"/>
+              <a:gd name="csY0" fmla="*/ 180000 h 1800000"/>
+              <a:gd name="csX1" fmla="*/ 180000 w 6120000"/>
+              <a:gd name="csY1" fmla="*/ 1620000 h 1800000"/>
+              <a:gd name="csX2" fmla="*/ 5940000 w 6120000"/>
+              <a:gd name="csY2" fmla="*/ 1620000 h 1800000"/>
+              <a:gd name="csX3" fmla="*/ 5940000 w 6120000"/>
+              <a:gd name="csY3" fmla="*/ 180000 h 1800000"/>
+              <a:gd name="csX4" fmla="*/ 0 w 6120000"/>
+              <a:gd name="csY4" fmla="*/ 0 h 1800000"/>
+              <a:gd name="csX5" fmla="*/ 180000 w 6120000"/>
+              <a:gd name="csY5" fmla="*/ 0 h 1800000"/>
+              <a:gd name="csX6" fmla="*/ 6120000 w 6120000"/>
+              <a:gd name="csY6" fmla="*/ 0 h 1800000"/>
+              <a:gd name="csX7" fmla="*/ 6120000 w 6120000"/>
+              <a:gd name="csY7" fmla="*/ 180000 h 1800000"/>
+              <a:gd name="csX8" fmla="*/ 6120000 w 6120000"/>
+              <a:gd name="csY8" fmla="*/ 1620000 h 1800000"/>
+              <a:gd name="csX9" fmla="*/ 6120000 w 6120000"/>
+              <a:gd name="csY9" fmla="*/ 1800000 h 1800000"/>
+              <a:gd name="csX10" fmla="*/ 180000 w 6120000"/>
+              <a:gd name="csY10" fmla="*/ 1800000 h 1800000"/>
+              <a:gd name="csX11" fmla="*/ 0 w 6120000"/>
+              <a:gd name="csY11" fmla="*/ 1800000 h 1800000"/>
+              <a:gd name="csX0" fmla="*/ 180000 w 6120000"/>
+              <a:gd name="csY0" fmla="*/ 180000 h 1800000"/>
+              <a:gd name="csX1" fmla="*/ 180000 w 6120000"/>
+              <a:gd name="csY1" fmla="*/ 1620000 h 1800000"/>
+              <a:gd name="csX2" fmla="*/ 5940000 w 6120000"/>
+              <a:gd name="csY2" fmla="*/ 1620000 h 1800000"/>
+              <a:gd name="csX3" fmla="*/ 5940000 w 6120000"/>
+              <a:gd name="csY3" fmla="*/ 180000 h 1800000"/>
+              <a:gd name="csX4" fmla="*/ 180000 w 6120000"/>
+              <a:gd name="csY4" fmla="*/ 180000 h 1800000"/>
+              <a:gd name="csX5" fmla="*/ 0 w 6120000"/>
+              <a:gd name="csY5" fmla="*/ 0 h 1800000"/>
+              <a:gd name="csX6" fmla="*/ 180000 w 6120000"/>
+              <a:gd name="csY6" fmla="*/ 0 h 1800000"/>
+              <a:gd name="csX7" fmla="*/ 6120000 w 6120000"/>
+              <a:gd name="csY7" fmla="*/ 0 h 1800000"/>
+              <a:gd name="csX8" fmla="*/ 6120000 w 6120000"/>
+              <a:gd name="csY8" fmla="*/ 1620000 h 1800000"/>
+              <a:gd name="csX9" fmla="*/ 6120000 w 6120000"/>
+              <a:gd name="csY9" fmla="*/ 1800000 h 1800000"/>
+              <a:gd name="csX10" fmla="*/ 180000 w 6120000"/>
+              <a:gd name="csY10" fmla="*/ 1800000 h 1800000"/>
+              <a:gd name="csX11" fmla="*/ 0 w 6120000"/>
+              <a:gd name="csY11" fmla="*/ 1800000 h 1800000"/>
+              <a:gd name="csX12" fmla="*/ 0 w 6120000"/>
+              <a:gd name="csY12" fmla="*/ 0 h 1800000"/>
+              <a:gd name="csX0" fmla="*/ 180000 w 6120000"/>
+              <a:gd name="csY0" fmla="*/ 180000 h 1800000"/>
+              <a:gd name="csX1" fmla="*/ 180000 w 6120000"/>
+              <a:gd name="csY1" fmla="*/ 1620000 h 1800000"/>
+              <a:gd name="csX2" fmla="*/ 5940000 w 6120000"/>
+              <a:gd name="csY2" fmla="*/ 1620000 h 1800000"/>
+              <a:gd name="csX3" fmla="*/ 5940000 w 6120000"/>
+              <a:gd name="csY3" fmla="*/ 180000 h 1800000"/>
+              <a:gd name="csX4" fmla="*/ 180000 w 6120000"/>
+              <a:gd name="csY4" fmla="*/ 180000 h 1800000"/>
+              <a:gd name="csX5" fmla="*/ 0 w 6120000"/>
+              <a:gd name="csY5" fmla="*/ 0 h 1800000"/>
+              <a:gd name="csX6" fmla="*/ 180000 w 6120000"/>
+              <a:gd name="csY6" fmla="*/ 0 h 1800000"/>
+              <a:gd name="csX7" fmla="*/ 6120000 w 6120000"/>
+              <a:gd name="csY7" fmla="*/ 0 h 1800000"/>
+              <a:gd name="csX8" fmla="*/ 6120000 w 6120000"/>
+              <a:gd name="csY8" fmla="*/ 1800000 h 1800000"/>
+              <a:gd name="csX9" fmla="*/ 180000 w 6120000"/>
+              <a:gd name="csY9" fmla="*/ 1800000 h 1800000"/>
+              <a:gd name="csX10" fmla="*/ 0 w 6120000"/>
+              <a:gd name="csY10" fmla="*/ 1800000 h 1800000"/>
+              <a:gd name="csX11" fmla="*/ 0 w 6120000"/>
+              <a:gd name="csY11" fmla="*/ 0 h 1800000"/>
+            </a:gdLst>
+            <a:ahLst/>
+            <a:cxnLst>
+              <a:cxn ang="0">
+                <a:pos x="csX0" y="csY0"/>
+              </a:cxn>
+              <a:cxn ang="0">
+                <a:pos x="csX1" y="csY1"/>
+              </a:cxn>
+              <a:cxn ang="0">
+                <a:pos x="csX2" y="csY2"/>
+              </a:cxn>
+              <a:cxn ang="0">
+                <a:pos x="csX3" y="csY3"/>
+              </a:cxn>
+              <a:cxn ang="0">
+                <a:pos x="csX4" y="csY4"/>
+              </a:cxn>
+              <a:cxn ang="0">
+                <a:pos x="csX5" y="csY5"/>
+              </a:cxn>
+              <a:cxn ang="0">
+                <a:pos x="csX6" y="csY6"/>
+              </a:cxn>
+              <a:cxn ang="0">
+                <a:pos x="csX7" y="csY7"/>
+              </a:cxn>
+              <a:cxn ang="0">
+                <a:pos x="csX8" y="csY8"/>
+              </a:cxn>
+              <a:cxn ang="0">
+                <a:pos x="csX9" y="csY9"/>
+              </a:cxn>
+              <a:cxn ang="0">
+                <a:pos x="csX10" y="csY10"/>
+              </a:cxn>
+              <a:cxn ang="0">
+                <a:pos x="csX11" y="csY11"/>
+              </a:cxn>
+            </a:cxnLst>
+            <a:rect l="l" t="t" r="r" b="b"/>
+            <a:pathLst>
+              <a:path w="6120000" h="1800000">
+                <a:moveTo>
+                  <a:pt x="180000" y="180000"/>
+                </a:moveTo>
+                <a:lnTo>
+                  <a:pt x="180000" y="1620000"/>
+                </a:lnTo>
+                <a:lnTo>
+                  <a:pt x="5940000" y="1620000"/>
+                </a:lnTo>
+                <a:lnTo>
+                  <a:pt x="5940000" y="180000"/>
+                </a:lnTo>
+                <a:lnTo>
+                  <a:pt x="180000" y="180000"/>
+                </a:lnTo>
+                <a:close/>
+                <a:moveTo>
+                  <a:pt x="0" y="0"/>
+                </a:moveTo>
+                <a:lnTo>
+                  <a:pt x="180000" y="0"/>
+                </a:lnTo>
+                <a:lnTo>
+                  <a:pt x="6120000" y="0"/>
+                </a:lnTo>
+                <a:lnTo>
+                  <a:pt x="6120000" y="1800000"/>
+                </a:lnTo>
+                <a:lnTo>
+                  <a:pt x="180000" y="1800000"/>
+                </a:lnTo>
+                <a:lnTo>
+                  <a:pt x="0" y="1800000"/>
+                </a:lnTo>
+                <a:lnTo>
+                  <a:pt x="0" y="0"/>
+                </a:lnTo>
+                <a:close/>
+              </a:path>
+            </a:pathLst>
+          </a:custGeom>
+          <a:solidFill>
+            <a:schemeClr val="bg1">
+              <a:lumMod val="65000"/>
+            </a:schemeClr>
+          </a:solidFill>
+          <a:ln>
+            <a:noFill/>
+          </a:ln>
+        </p:spPr>
+        <p:style>
+          <a:lnRef idx="2">
+            <a:schemeClr val="accent1">
+              <a:shade val="15000"/>
+            </a:schemeClr>
+          </a:lnRef>
+          <a:fillRef idx="1">
+            <a:schemeClr val="accent1"/>
+          </a:fillRef>
+          <a:effectRef idx="0">
+            <a:schemeClr val="accent1"/>
+          </a:effectRef>
+          <a:fontRef idx="minor">
+            <a:schemeClr val="lt1"/>
+          </a:fontRef>
+        </p:style>
+        <p:txBody>
+          <a:bodyPr wrap="square" rtlCol="0" anchor="ctr">
+            <a:noAutofit/>
+          </a:bodyPr>
+          <a:lstStyle/>
+          <a:p>
+            <a:pPr algn="ctr"/>
+            <a:endParaRPr kumimoji="1" lang="ja-JP" altLang="en-US" sz="2592"/>
+          </a:p>
+        </p:txBody>
+      </p:sp>
+      <p:sp>
+        <p:nvSpPr>
+          <p:cNvPr id="17" name="フリーフォーム: 図形 16">
+            <a:extLst>
+              <a:ext uri="{FF2B5EF4-FFF2-40B4-BE49-F238E27FC236}">
+                <a16:creationId xmlns:a16="http://schemas.microsoft.com/office/drawing/2014/main" id="{862BD9AF-3603-7286-6309-35A90136C615}"/>
+              </a:ext>
+            </a:extLst>
+          </p:cNvPr>
+          <p:cNvSpPr/>
+          <p:nvPr/>
+        </p:nvSpPr>
+        <p:spPr>
+          <a:xfrm>
+            <a:off x="720381" y="3600381"/>
+            <a:ext cx="1440000" cy="1440000"/>
+          </a:xfrm>
+          <a:custGeom>
+            <a:avLst/>
+            <a:gdLst>
+              <a:gd name="csX0" fmla="*/ 3600000 w 5760000"/>
+              <a:gd name="csY0" fmla="*/ 3240000 h 5760000"/>
+              <a:gd name="csX1" fmla="*/ 4320000 w 5760000"/>
+              <a:gd name="csY1" fmla="*/ 3240000 h 5760000"/>
+              <a:gd name="csX2" fmla="*/ 4320000 w 5760000"/>
+              <a:gd name="csY2" fmla="*/ 3600000 h 5760000"/>
+              <a:gd name="csX3" fmla="*/ 3600000 w 5760000"/>
+              <a:gd name="csY3" fmla="*/ 3600000 h 5760000"/>
+              <a:gd name="csX4" fmla="*/ 1080000 w 5760000"/>
+              <a:gd name="csY4" fmla="*/ 1800000 h 5760000"/>
+              <a:gd name="csX5" fmla="*/ 1080000 w 5760000"/>
+              <a:gd name="csY5" fmla="*/ 2160000 h 5760000"/>
+              <a:gd name="csX6" fmla="*/ 1440000 w 5760000"/>
+              <a:gd name="csY6" fmla="*/ 2160000 h 5760000"/>
+              <a:gd name="csX7" fmla="*/ 1800000 w 5760000"/>
+              <a:gd name="csY7" fmla="*/ 2880000 h 5760000"/>
+              <a:gd name="csX8" fmla="*/ 1440000 w 5760000"/>
+              <a:gd name="csY8" fmla="*/ 3600000 h 5760000"/>
+              <a:gd name="csX9" fmla="*/ 1080000 w 5760000"/>
+              <a:gd name="csY9" fmla="*/ 3600000 h 5760000"/>
+              <a:gd name="csX10" fmla="*/ 1080000 w 5760000"/>
+              <a:gd name="csY10" fmla="*/ 3960000 h 5760000"/>
+              <a:gd name="csX11" fmla="*/ 1620000 w 5760000"/>
+              <a:gd name="csY11" fmla="*/ 3960000 h 5760000"/>
+              <a:gd name="csX12" fmla="*/ 1980000 w 5760000"/>
+              <a:gd name="csY12" fmla="*/ 3240000 h 5760000"/>
+              <a:gd name="csX13" fmla="*/ 2340000 w 5760000"/>
+              <a:gd name="csY13" fmla="*/ 3960000 h 5760000"/>
+              <a:gd name="csX14" fmla="*/ 2880000 w 5760000"/>
+              <a:gd name="csY14" fmla="*/ 3960000 h 5760000"/>
+              <a:gd name="csX15" fmla="*/ 2880000 w 5760000"/>
+              <a:gd name="csY15" fmla="*/ 3600000 h 5760000"/>
+              <a:gd name="csX16" fmla="*/ 2520000 w 5760000"/>
+              <a:gd name="csY16" fmla="*/ 3600000 h 5760000"/>
+              <a:gd name="csX17" fmla="*/ 2160000 w 5760000"/>
+              <a:gd name="csY17" fmla="*/ 2880000 h 5760000"/>
+              <a:gd name="csX18" fmla="*/ 2520000 w 5760000"/>
+              <a:gd name="csY18" fmla="*/ 2160000 h 5760000"/>
+              <a:gd name="csX19" fmla="*/ 2880000 w 5760000"/>
+              <a:gd name="csY19" fmla="*/ 2160000 h 5760000"/>
+              <a:gd name="csX20" fmla="*/ 2880000 w 5760000"/>
+              <a:gd name="csY20" fmla="*/ 1800000 h 5760000"/>
+              <a:gd name="csX21" fmla="*/ 2520000 w 5760000"/>
+              <a:gd name="csY21" fmla="*/ 1800000 h 5760000"/>
+              <a:gd name="csX22" fmla="*/ 2340000 w 5760000"/>
+              <a:gd name="csY22" fmla="*/ 1800000 h 5760000"/>
+              <a:gd name="csX23" fmla="*/ 1980000 w 5760000"/>
+              <a:gd name="csY23" fmla="*/ 2520000 h 5760000"/>
+              <a:gd name="csX24" fmla="*/ 1620000 w 5760000"/>
+              <a:gd name="csY24" fmla="*/ 1800000 h 5760000"/>
+              <a:gd name="csX25" fmla="*/ 2880000 w 5760000"/>
+              <a:gd name="csY25" fmla="*/ 0 h 5760000"/>
+              <a:gd name="csX26" fmla="*/ 5760000 w 5760000"/>
+              <a:gd name="csY26" fmla="*/ 2880000 h 5760000"/>
+              <a:gd name="csX27" fmla="*/ 4680000 w 5760000"/>
+              <a:gd name="csY27" fmla="*/ 3960000 h 5760000"/>
+              <a:gd name="csX28" fmla="*/ 4680000 w 5760000"/>
+              <a:gd name="csY28" fmla="*/ 2340000 h 5760000"/>
+              <a:gd name="csX29" fmla="*/ 4500000 w 5760000"/>
+              <a:gd name="csY29" fmla="*/ 2160000 h 5760000"/>
+              <a:gd name="csX30" fmla="*/ 3240000 w 5760000"/>
+              <a:gd name="csY30" fmla="*/ 2160000 h 5760000"/>
+              <a:gd name="csX31" fmla="*/ 3240000 w 5760000"/>
+              <a:gd name="csY31" fmla="*/ 2520000 h 5760000"/>
+              <a:gd name="csX32" fmla="*/ 4320000 w 5760000"/>
+              <a:gd name="csY32" fmla="*/ 2520000 h 5760000"/>
+              <a:gd name="csX33" fmla="*/ 4320000 w 5760000"/>
+              <a:gd name="csY33" fmla="*/ 2880000 h 5760000"/>
+              <a:gd name="csX34" fmla="*/ 3420000 w 5760000"/>
+              <a:gd name="csY34" fmla="*/ 2880000 h 5760000"/>
+              <a:gd name="csX35" fmla="*/ 3240000 w 5760000"/>
+              <a:gd name="csY35" fmla="*/ 3060000 h 5760000"/>
+              <a:gd name="csX36" fmla="*/ 3240000 w 5760000"/>
+              <a:gd name="csY36" fmla="*/ 3780000 h 5760000"/>
+              <a:gd name="csX37" fmla="*/ 3420000 w 5760000"/>
+              <a:gd name="csY37" fmla="*/ 3960000 h 5760000"/>
+              <a:gd name="csX38" fmla="*/ 4680000 w 5760000"/>
+              <a:gd name="csY38" fmla="*/ 3960000 h 5760000"/>
+              <a:gd name="csX39" fmla="*/ 2880000 w 5760000"/>
+              <a:gd name="csY39" fmla="*/ 5760000 h 5760000"/>
+              <a:gd name="csX40" fmla="*/ 0 w 5760000"/>
+              <a:gd name="csY40" fmla="*/ 2880000 h 5760000"/>
+            </a:gdLst>
+            <a:ahLst/>
+            <a:cxnLst>
+              <a:cxn ang="0">
+                <a:pos x="csX0" y="csY0"/>
+              </a:cxn>
+              <a:cxn ang="0">
+                <a:pos x="csX1" y="csY1"/>
+              </a:cxn>
+              <a:cxn ang="0">
+                <a:pos x="csX2" y="csY2"/>
+              </a:cxn>
+              <a:cxn ang="0">
+                <a:pos x="csX3" y="csY3"/>
+              </a:cxn>
+              <a:cxn ang="0">
+                <a:pos x="csX4" y="csY4"/>
+              </a:cxn>
+              <a:cxn ang="0">
+                <a:pos x="csX5" y="csY5"/>
+              </a:cxn>
+              <a:cxn ang="0">
+                <a:pos x="csX6" y="csY6"/>
+              </a:cxn>
+              <a:cxn ang="0">
+                <a:pos x="csX7" y="csY7"/>
+              </a:cxn>
+              <a:cxn ang="0">
+                <a:pos x="csX8" y="csY8"/>
+              </a:cxn>
+              <a:cxn ang="0">
+                <a:pos x="csX9" y="csY9"/>
+              </a:cxn>
+              <a:cxn ang="0">
+                <a:pos x="csX10" y="csY10"/>
+              </a:cxn>
+              <a:cxn ang="0">
+                <a:pos x="csX11" y="csY11"/>
+              </a:cxn>
+              <a:cxn ang="0">
+                <a:pos x="csX12" y="csY12"/>
+              </a:cxn>
+              <a:cxn ang="0">
+                <a:pos x="csX13" y="csY13"/>
+              </a:cxn>
+              <a:cxn ang="0">
+                <a:pos x="csX14" y="csY14"/>
+              </a:cxn>
+              <a:cxn ang="0">
+                <a:pos x="csX15" y="csY15"/>
+              </a:cxn>
+              <a:cxn ang="0">
+                <a:pos x="csX16" y="csY16"/>
+              </a:cxn>
+              <a:cxn ang="0">
+                <a:pos x="csX17" y="csY17"/>
+              </a:cxn>
+              <a:cxn ang="0">
+                <a:pos x="csX18" y="csY18"/>
+              </a:cxn>
+              <a:cxn ang="0">
+                <a:pos x="csX19" y="csY19"/>
+              </a:cxn>
+              <a:cxn ang="0">
+                <a:pos x="csX20" y="csY20"/>
+              </a:cxn>
+              <a:cxn ang="0">
+                <a:pos x="csX21" y="csY21"/>
+              </a:cxn>
+              <a:cxn ang="0">
+                <a:pos x="csX22" y="csY22"/>
+              </a:cxn>
+              <a:cxn ang="0">
+                <a:pos x="csX23" y="csY23"/>
+              </a:cxn>
+              <a:cxn ang="0">
+                <a:pos x="csX24" y="csY24"/>
+              </a:cxn>
+              <a:cxn ang="0">
+                <a:pos x="csX25" y="csY25"/>
+              </a:cxn>
+              <a:cxn ang="0">
+                <a:pos x="csX26" y="csY26"/>
+              </a:cxn>
+              <a:cxn ang="0">
+                <a:pos x="csX27" y="csY27"/>
+              </a:cxn>
+              <a:cxn ang="0">
+                <a:pos x="csX28" y="csY28"/>
+              </a:cxn>
+              <a:cxn ang="0">
+                <a:pos x="csX29" y="csY29"/>
+              </a:cxn>
+              <a:cxn ang="0">
+                <a:pos x="csX30" y="csY30"/>
+              </a:cxn>
+              <a:cxn ang="0">
+                <a:pos x="csX31" y="csY31"/>
+              </a:cxn>
+              <a:cxn ang="0">
+                <a:pos x="csX32" y="csY32"/>
+              </a:cxn>
+              <a:cxn ang="0">
+                <a:pos x="csX33" y="csY33"/>
+              </a:cxn>
+              <a:cxn ang="0">
+                <a:pos x="csX34" y="csY34"/>
+              </a:cxn>
+              <a:cxn ang="0">
+                <a:pos x="csX35" y="csY35"/>
+              </a:cxn>
+              <a:cxn ang="0">
+                <a:pos x="csX36" y="csY36"/>
+              </a:cxn>
+              <a:cxn ang="0">
+                <a:pos x="csX37" y="csY37"/>
+              </a:cxn>
+              <a:cxn ang="0">
+                <a:pos x="csX38" y="csY38"/>
+              </a:cxn>
+              <a:cxn ang="0">
+                <a:pos x="csX39" y="csY39"/>
+              </a:cxn>
+              <a:cxn ang="0">
+                <a:pos x="csX40" y="csY40"/>
+              </a:cxn>
+            </a:cxnLst>
+            <a:rect l="l" t="t" r="r" b="b"/>
+            <a:pathLst>
+              <a:path w="5760000" h="5760000">
+                <a:moveTo>
+                  <a:pt x="3600000" y="3240000"/>
+                </a:moveTo>
+                <a:lnTo>
+                  <a:pt x="4320000" y="3240000"/>
+                </a:lnTo>
+                <a:lnTo>
+                  <a:pt x="4320000" y="3600000"/>
+                </a:lnTo>
+                <a:lnTo>
+                  <a:pt x="3600000" y="3600000"/>
+                </a:lnTo>
+                <a:close/>
+                <a:moveTo>
+                  <a:pt x="1080000" y="1800000"/>
+                </a:moveTo>
+                <a:lnTo>
+                  <a:pt x="1080000" y="2160000"/>
+                </a:lnTo>
+                <a:lnTo>
+                  <a:pt x="1440000" y="2160000"/>
+                </a:lnTo>
+                <a:lnTo>
+                  <a:pt x="1800000" y="2880000"/>
+                </a:lnTo>
+                <a:lnTo>
+                  <a:pt x="1440000" y="3600000"/>
+                </a:lnTo>
+                <a:lnTo>
+                  <a:pt x="1080000" y="3600000"/>
+                </a:lnTo>
+                <a:lnTo>
+                  <a:pt x="1080000" y="3960000"/>
+                </a:lnTo>
+                <a:lnTo>
+                  <a:pt x="1620000" y="3960000"/>
+                </a:lnTo>
+                <a:lnTo>
+                  <a:pt x="1980000" y="3240000"/>
+                </a:lnTo>
+                <a:lnTo>
+                  <a:pt x="2340000" y="3960000"/>
+                </a:lnTo>
+                <a:lnTo>
+                  <a:pt x="2880000" y="3960000"/>
+                </a:lnTo>
+                <a:lnTo>
+                  <a:pt x="2880000" y="3600000"/>
+                </a:lnTo>
+                <a:lnTo>
+                  <a:pt x="2520000" y="3600000"/>
+                </a:lnTo>
+                <a:lnTo>
+                  <a:pt x="2160000" y="2880000"/>
+                </a:lnTo>
+                <a:lnTo>
+                  <a:pt x="2520000" y="2160000"/>
+                </a:lnTo>
+                <a:lnTo>
+                  <a:pt x="2880000" y="2160000"/>
+                </a:lnTo>
+                <a:lnTo>
+                  <a:pt x="2880000" y="1800000"/>
+                </a:lnTo>
+                <a:lnTo>
+                  <a:pt x="2520000" y="1800000"/>
+                </a:lnTo>
+                <a:lnTo>
+                  <a:pt x="2340000" y="1800000"/>
+                </a:lnTo>
+                <a:lnTo>
+                  <a:pt x="1980000" y="2520000"/>
+                </a:lnTo>
+                <a:lnTo>
+                  <a:pt x="1620000" y="1800000"/>
+                </a:lnTo>
+                <a:close/>
+                <a:moveTo>
+                  <a:pt x="2880000" y="0"/>
+                </a:moveTo>
+                <a:lnTo>
+                  <a:pt x="5760000" y="2880000"/>
+                </a:lnTo>
+                <a:lnTo>
+                  <a:pt x="4680000" y="3960000"/>
+                </a:lnTo>
+                <a:lnTo>
+                  <a:pt x="4680000" y="2340000"/>
+                </a:lnTo>
+                <a:lnTo>
+                  <a:pt x="4500000" y="2160000"/>
+                </a:lnTo>
+                <a:lnTo>
+                  <a:pt x="3240000" y="2160000"/>
+                </a:lnTo>
+                <a:lnTo>
+                  <a:pt x="3240000" y="2520000"/>
+                </a:lnTo>
+                <a:lnTo>
+                  <a:pt x="4320000" y="2520000"/>
+                </a:lnTo>
+                <a:lnTo>
+                  <a:pt x="4320000" y="2880000"/>
+                </a:lnTo>
+                <a:lnTo>
+                  <a:pt x="3420000" y="2880000"/>
+                </a:lnTo>
+                <a:lnTo>
+                  <a:pt x="3240000" y="3060000"/>
+                </a:lnTo>
+                <a:lnTo>
+                  <a:pt x="3240000" y="3780000"/>
+                </a:lnTo>
+                <a:lnTo>
+                  <a:pt x="3420000" y="3960000"/>
+                </a:lnTo>
+                <a:lnTo>
+                  <a:pt x="4680000" y="3960000"/>
+                </a:lnTo>
+                <a:lnTo>
+                  <a:pt x="2880000" y="5760000"/>
+                </a:lnTo>
+                <a:lnTo>
+                  <a:pt x="0" y="2880000"/>
+                </a:lnTo>
+                <a:close/>
+              </a:path>
+            </a:pathLst>
+          </a:custGeom>
+          <a:gradFill flip="none" rotWithShape="1">
+            <a:gsLst>
+              <a:gs pos="70000">
+                <a:srgbClr val="C00000">
+                  <a:lumMod val="70000"/>
+                </a:srgbClr>
+              </a:gs>
+              <a:gs pos="30000">
+                <a:srgbClr val="FF0000">
+                  <a:lumMod val="90000"/>
+                </a:srgbClr>
+              </a:gs>
+            </a:gsLst>
+            <a:lin ang="2700000" scaled="1"/>
+            <a:tileRect/>
+          </a:gradFill>
+          <a:ln>
+            <a:noFill/>
+          </a:ln>
+        </p:spPr>
+        <p:style>
+          <a:lnRef idx="2">
+            <a:schemeClr val="accent1">
+              <a:shade val="15000"/>
+            </a:schemeClr>
+          </a:lnRef>
+          <a:fillRef idx="1">
+            <a:schemeClr val="accent1"/>
+          </a:fillRef>
+          <a:effectRef idx="0">
+            <a:schemeClr val="accent1"/>
+          </a:effectRef>
+          <a:fontRef idx="minor">
+            <a:schemeClr val="lt1"/>
+          </a:fontRef>
+        </p:style>
+        <p:txBody>
+          <a:bodyPr wrap="square" rtlCol="0" anchor="ctr">
+            <a:noAutofit/>
+          </a:bodyPr>
+          <a:lstStyle/>
+          <a:p>
+            <a:pPr algn="ctr"/>
+            <a:endParaRPr kumimoji="1" lang="ja-JP" altLang="en-US"/>
+          </a:p>
+        </p:txBody>
+      </p:sp>
+      <p:sp>
+        <p:nvSpPr>
+          <p:cNvPr id="21" name="テキスト ボックス 20">
+            <a:extLst>
+              <a:ext uri="{FF2B5EF4-FFF2-40B4-BE49-F238E27FC236}">
+                <a16:creationId xmlns:a16="http://schemas.microsoft.com/office/drawing/2014/main" id="{45D490C0-A0C0-40EB-E3CB-55D706DDA2DB}"/>
+              </a:ext>
+            </a:extLst>
+          </p:cNvPr>
+          <p:cNvSpPr txBox="1"/>
+          <p:nvPr/>
+        </p:nvSpPr>
+        <p:spPr>
+          <a:xfrm>
+            <a:off x="2348651" y="3907785"/>
+            <a:ext cx="4130778" cy="977660"/>
+          </a:xfrm>
+          <a:custGeom>
+            <a:avLst/>
+            <a:gdLst/>
+            <a:ahLst/>
+            <a:cxnLst/>
+            <a:rect l="l" t="t" r="r" b="b"/>
+            <a:pathLst>
+              <a:path w="4130778" h="977660">
+                <a:moveTo>
+                  <a:pt x="744770" y="544273"/>
+                </a:moveTo>
+                <a:lnTo>
+                  <a:pt x="672936" y="591326"/>
+                </a:lnTo>
+                <a:lnTo>
+                  <a:pt x="672936" y="645809"/>
+                </a:lnTo>
+                <a:lnTo>
+                  <a:pt x="756164" y="717132"/>
+                </a:lnTo>
+                <a:lnTo>
+                  <a:pt x="970178" y="661164"/>
+                </a:lnTo>
+                <a:lnTo>
+                  <a:pt x="970178" y="544273"/>
+                </a:lnTo>
+                <a:close/>
+                <a:moveTo>
+                  <a:pt x="2120131" y="349186"/>
+                </a:moveTo>
+                <a:lnTo>
+                  <a:pt x="1932370" y="394259"/>
+                </a:lnTo>
+                <a:lnTo>
+                  <a:pt x="1932370" y="705307"/>
+                </a:lnTo>
+                <a:lnTo>
+                  <a:pt x="2098829" y="705307"/>
+                </a:lnTo>
+                <a:lnTo>
+                  <a:pt x="2203856" y="597332"/>
+                </a:lnTo>
+                <a:lnTo>
+                  <a:pt x="2203856" y="419024"/>
+                </a:lnTo>
+                <a:close/>
+                <a:moveTo>
+                  <a:pt x="3858383" y="341200"/>
+                </a:moveTo>
+                <a:lnTo>
+                  <a:pt x="3762770" y="464586"/>
+                </a:lnTo>
+                <a:lnTo>
+                  <a:pt x="3762770" y="476479"/>
+                </a:lnTo>
+                <a:lnTo>
+                  <a:pt x="4012455" y="476479"/>
+                </a:lnTo>
+                <a:lnTo>
+                  <a:pt x="4052087" y="440305"/>
+                </a:lnTo>
+                <a:lnTo>
+                  <a:pt x="4052087" y="377373"/>
+                </a:lnTo>
+                <a:lnTo>
+                  <a:pt x="4011464" y="341200"/>
+                </a:lnTo>
+                <a:close/>
+                <a:moveTo>
+                  <a:pt x="3818256" y="270929"/>
+                </a:moveTo>
+                <a:lnTo>
+                  <a:pt x="4046142" y="270929"/>
+                </a:lnTo>
+                <a:lnTo>
+                  <a:pt x="4130778" y="356561"/>
+                </a:lnTo>
+                <a:lnTo>
+                  <a:pt x="4130778" y="480437"/>
+                </a:lnTo>
+                <a:lnTo>
+                  <a:pt x="4067925" y="539815"/>
+                </a:lnTo>
+                <a:lnTo>
+                  <a:pt x="3762770" y="539815"/>
+                </a:lnTo>
+                <a:lnTo>
+                  <a:pt x="3762770" y="589364"/>
+                </a:lnTo>
+                <a:lnTo>
+                  <a:pt x="3876713" y="705802"/>
+                </a:lnTo>
+                <a:lnTo>
+                  <a:pt x="4108507" y="705802"/>
+                </a:lnTo>
+                <a:lnTo>
+                  <a:pt x="4096629" y="779540"/>
+                </a:lnTo>
+                <a:lnTo>
+                  <a:pt x="3835099" y="779540"/>
+                </a:lnTo>
+                <a:lnTo>
+                  <a:pt x="3674173" y="609679"/>
+                </a:lnTo>
+                <a:lnTo>
+                  <a:pt x="3674173" y="440801"/>
+                </a:lnTo>
+                <a:close/>
+                <a:moveTo>
+                  <a:pt x="2464765" y="270929"/>
+                </a:moveTo>
+                <a:lnTo>
+                  <a:pt x="2713377" y="270929"/>
+                </a:lnTo>
+                <a:lnTo>
+                  <a:pt x="2763864" y="327846"/>
+                </a:lnTo>
+                <a:lnTo>
+                  <a:pt x="2763864" y="779540"/>
+                </a:lnTo>
+                <a:lnTo>
+                  <a:pt x="2669324" y="779540"/>
+                </a:lnTo>
+                <a:lnTo>
+                  <a:pt x="2669324" y="352592"/>
+                </a:lnTo>
+                <a:lnTo>
+                  <a:pt x="2452878" y="352592"/>
+                </a:lnTo>
+                <a:close/>
+                <a:moveTo>
+                  <a:pt x="664522" y="270929"/>
+                </a:moveTo>
+                <a:lnTo>
+                  <a:pt x="961262" y="270929"/>
+                </a:lnTo>
+                <a:lnTo>
+                  <a:pt x="1062242" y="377372"/>
+                </a:lnTo>
+                <a:lnTo>
+                  <a:pt x="1062242" y="779540"/>
+                </a:lnTo>
+                <a:lnTo>
+                  <a:pt x="996906" y="779540"/>
+                </a:lnTo>
+                <a:lnTo>
+                  <a:pt x="977108" y="717132"/>
+                </a:lnTo>
+                <a:lnTo>
+                  <a:pt x="723468" y="790932"/>
+                </a:lnTo>
+                <a:lnTo>
+                  <a:pt x="587807" y="678994"/>
+                </a:lnTo>
+                <a:lnTo>
+                  <a:pt x="587807" y="562599"/>
+                </a:lnTo>
+                <a:lnTo>
+                  <a:pt x="710587" y="479946"/>
+                </a:lnTo>
+                <a:lnTo>
+                  <a:pt x="970178" y="479946"/>
+                </a:lnTo>
+                <a:lnTo>
+                  <a:pt x="970178" y="398679"/>
+                </a:lnTo>
+                <a:lnTo>
+                  <a:pt x="918162" y="344667"/>
+                </a:lnTo>
+                <a:lnTo>
+                  <a:pt x="652643" y="344667"/>
+                </a:lnTo>
+                <a:close/>
+                <a:moveTo>
+                  <a:pt x="2149855" y="259042"/>
+                </a:moveTo>
+                <a:lnTo>
+                  <a:pt x="2297901" y="392278"/>
+                </a:lnTo>
+                <a:lnTo>
+                  <a:pt x="2297901" y="625564"/>
+                </a:lnTo>
+                <a:lnTo>
+                  <a:pt x="2141433" y="779540"/>
+                </a:lnTo>
+                <a:lnTo>
+                  <a:pt x="1938314" y="779540"/>
+                </a:lnTo>
+                <a:lnTo>
+                  <a:pt x="1938314" y="967754"/>
+                </a:lnTo>
+                <a:lnTo>
+                  <a:pt x="1842782" y="977660"/>
+                </a:lnTo>
+                <a:lnTo>
+                  <a:pt x="1842782" y="270929"/>
+                </a:lnTo>
+                <a:lnTo>
+                  <a:pt x="1908615" y="270929"/>
+                </a:lnTo>
+                <a:lnTo>
+                  <a:pt x="1927424" y="330860"/>
+                </a:lnTo>
+                <a:close/>
+                <a:moveTo>
+                  <a:pt x="1538205" y="259042"/>
+                </a:moveTo>
+                <a:lnTo>
+                  <a:pt x="1664118" y="384339"/>
+                </a:lnTo>
+                <a:lnTo>
+                  <a:pt x="1665604" y="469025"/>
+                </a:lnTo>
+                <a:lnTo>
+                  <a:pt x="1569919" y="483387"/>
+                </a:lnTo>
+                <a:lnTo>
+                  <a:pt x="1569919" y="412568"/>
+                </a:lnTo>
+                <a:lnTo>
+                  <a:pt x="1506492" y="342739"/>
+                </a:lnTo>
+                <a:lnTo>
+                  <a:pt x="1325132" y="386320"/>
+                </a:lnTo>
+                <a:lnTo>
+                  <a:pt x="1325132" y="779540"/>
+                </a:lnTo>
+                <a:lnTo>
+                  <a:pt x="1230592" y="779540"/>
+                </a:lnTo>
+                <a:lnTo>
+                  <a:pt x="1230592" y="270929"/>
+                </a:lnTo>
+                <a:lnTo>
+                  <a:pt x="1299393" y="270929"/>
+                </a:lnTo>
+                <a:lnTo>
+                  <a:pt x="1320182" y="331844"/>
+                </a:lnTo>
+                <a:close/>
+                <a:moveTo>
+                  <a:pt x="3255697" y="131750"/>
+                </a:moveTo>
+                <a:lnTo>
+                  <a:pt x="3255697" y="318973"/>
+                </a:lnTo>
+                <a:lnTo>
+                  <a:pt x="3515234" y="318973"/>
+                </a:lnTo>
+                <a:lnTo>
+                  <a:pt x="3515234" y="394692"/>
+                </a:lnTo>
+                <a:lnTo>
+                  <a:pt x="3255697" y="394692"/>
+                </a:lnTo>
+                <a:lnTo>
+                  <a:pt x="3255697" y="603256"/>
+                </a:lnTo>
+                <a:lnTo>
+                  <a:pt x="3334450" y="700850"/>
+                </a:lnTo>
+                <a:lnTo>
+                  <a:pt x="3515234" y="700850"/>
+                </a:lnTo>
+                <a:lnTo>
+                  <a:pt x="3515234" y="779540"/>
+                </a:lnTo>
+                <a:lnTo>
+                  <a:pt x="3287891" y="779540"/>
+                </a:lnTo>
+                <a:lnTo>
+                  <a:pt x="3163633" y="631989"/>
+                </a:lnTo>
+                <a:lnTo>
+                  <a:pt x="3163633" y="394692"/>
+                </a:lnTo>
+                <a:lnTo>
+                  <a:pt x="3040303" y="394692"/>
+                </a:lnTo>
+                <a:lnTo>
+                  <a:pt x="3040303" y="318973"/>
+                </a:lnTo>
+                <a:lnTo>
+                  <a:pt x="3163633" y="318973"/>
+                </a:lnTo>
+                <a:lnTo>
+                  <a:pt x="3163633" y="148590"/>
+                </a:lnTo>
+                <a:close/>
+                <a:moveTo>
+                  <a:pt x="0" y="56464"/>
+                </a:moveTo>
+                <a:lnTo>
+                  <a:pt x="97017" y="56464"/>
+                </a:lnTo>
+                <a:lnTo>
+                  <a:pt x="97017" y="171367"/>
+                </a:lnTo>
+                <a:lnTo>
+                  <a:pt x="240687" y="359564"/>
+                </a:lnTo>
+                <a:lnTo>
+                  <a:pt x="363550" y="174339"/>
+                </a:lnTo>
+                <a:lnTo>
+                  <a:pt x="363550" y="56464"/>
+                </a:lnTo>
+                <a:lnTo>
+                  <a:pt x="453633" y="56464"/>
+                </a:lnTo>
+                <a:lnTo>
+                  <a:pt x="453633" y="195635"/>
+                </a:lnTo>
+                <a:lnTo>
+                  <a:pt x="292707" y="427909"/>
+                </a:lnTo>
+                <a:lnTo>
+                  <a:pt x="453633" y="638888"/>
+                </a:lnTo>
+                <a:lnTo>
+                  <a:pt x="453633" y="779540"/>
+                </a:lnTo>
+                <a:lnTo>
+                  <a:pt x="356616" y="779540"/>
+                </a:lnTo>
+                <a:lnTo>
+                  <a:pt x="356616" y="663651"/>
+                </a:lnTo>
+                <a:lnTo>
+                  <a:pt x="213440" y="476444"/>
+                </a:lnTo>
+                <a:lnTo>
+                  <a:pt x="90082" y="662660"/>
+                </a:lnTo>
+                <a:lnTo>
+                  <a:pt x="90082" y="779540"/>
+                </a:lnTo>
+                <a:lnTo>
+                  <a:pt x="0" y="779540"/>
+                </a:lnTo>
+                <a:lnTo>
+                  <a:pt x="0" y="640374"/>
+                </a:lnTo>
+                <a:lnTo>
+                  <a:pt x="160925" y="407604"/>
+                </a:lnTo>
+                <a:lnTo>
+                  <a:pt x="0" y="197121"/>
+                </a:lnTo>
+                <a:close/>
+                <a:moveTo>
+                  <a:pt x="2694568" y="0"/>
+                </a:moveTo>
+                <a:lnTo>
+                  <a:pt x="2775752" y="77267"/>
+                </a:lnTo>
+                <a:lnTo>
+                  <a:pt x="2694568" y="155029"/>
+                </a:lnTo>
+                <a:lnTo>
+                  <a:pt x="2612860" y="77267"/>
+                </a:lnTo>
+                <a:close/>
+              </a:path>
+            </a:pathLst>
+          </a:custGeom>
+          <a:solidFill>
+            <a:schemeClr val="tx1"/>
+          </a:solidFill>
+          <a:ln>
+            <a:noFill/>
+          </a:ln>
+          <a:effectLst/>
+        </p:spPr>
+        <p:txBody>
+          <a:bodyPr rot="0" spcFirstLastPara="0" vertOverflow="overflow" horzOverflow="overflow" vert="horz" wrap="square" lIns="91440" tIns="45720" rIns="91440" bIns="45720" numCol="1" spcCol="0" rtlCol="0" fromWordArt="0" anchor="t" anchorCtr="0" forceAA="0" compatLnSpc="1">
+            <a:prstTxWarp prst="textNoShape">
+              <a:avLst/>
+            </a:prstTxWarp>
+            <a:noAutofit/>
+          </a:bodyPr>
+          <a:lstStyle/>
+          <a:p>
+            <a:endParaRPr kumimoji="1" lang="ja-JP" altLang="en-US" sz="7800" dirty="0">
+              <a:latin typeface="Monaspace Krypton" panose="02000009000000000000" pitchFamily="49" charset="0"/>
+              <a:cs typeface="Monaspace Krypton" panose="02000009000000000000" pitchFamily="49" charset="0"/>
+            </a:endParaRPr>
+          </a:p>
+        </p:txBody>
+      </p:sp>
+      <p:sp>
+        <p:nvSpPr>
+          <p:cNvPr id="19" name="正方形/長方形 18">
+            <a:extLst>
+              <a:ext uri="{FF2B5EF4-FFF2-40B4-BE49-F238E27FC236}">
+                <a16:creationId xmlns:a16="http://schemas.microsoft.com/office/drawing/2014/main" id="{94D6F5FE-7EE1-333C-79C9-CF90FEE5222F}"/>
+              </a:ext>
+            </a:extLst>
+          </p:cNvPr>
+          <p:cNvSpPr/>
+          <p:nvPr/>
+        </p:nvSpPr>
+        <p:spPr>
+          <a:xfrm>
+            <a:off x="720381" y="3600381"/>
+            <a:ext cx="5760000" cy="1440000"/>
+          </a:xfrm>
+          <a:prstGeom prst="rect">
+            <a:avLst/>
+          </a:prstGeom>
+          <a:noFill/>
+          <a:ln>
+            <a:noFill/>
+          </a:ln>
+        </p:spPr>
+        <p:style>
+          <a:lnRef idx="2">
+            <a:schemeClr val="accent1">
+              <a:shade val="15000"/>
+            </a:schemeClr>
+          </a:lnRef>
+          <a:fillRef idx="1">
+            <a:schemeClr val="accent1"/>
+          </a:fillRef>
+          <a:effectRef idx="0">
+            <a:schemeClr val="accent1"/>
+          </a:effectRef>
+          <a:fontRef idx="minor">
+            <a:schemeClr val="lt1"/>
+          </a:fontRef>
+        </p:style>
+        <p:txBody>
+          <a:bodyPr rtlCol="0" anchor="ctr"/>
+          <a:lstStyle/>
+          <a:p>
+            <a:pPr algn="ctr"/>
+            <a:endParaRPr kumimoji="1" lang="ja-JP" altLang="en-US"/>
+          </a:p>
+        </p:txBody>
+      </p:sp>
+    </p:spTree>
+    <p:extLst>
+      <p:ext uri="{BB962C8B-B14F-4D97-AF65-F5344CB8AC3E}">
+        <p14:creationId xmlns:p14="http://schemas.microsoft.com/office/powerpoint/2010/main" val="1373974400"/>
+      </p:ext>
+    </p:extLst>
+  </p:cSld>
+  <p:clrMapOvr>
+    <a:masterClrMapping/>
+  </p:clrMapOvr>
+</p:sld>
+</file>
+
+<file path=ppt/slides/slide5.xml><?xml version="1.0" encoding="utf-8"?>
 <p:sld xmlns:a="http://schemas.openxmlformats.org/drawingml/2006/main" xmlns:r="http://schemas.openxmlformats.org/officeDocument/2006/relationships" xmlns:p="http://schemas.openxmlformats.org/presentationml/2006/main">
   <p:cSld>
     <p:spTree>
@@ -3914,7 +6243,7 @@
 </p:sld>
 </file>
 
-<file path=ppt/slides/slide4.xml><?xml version="1.0" encoding="utf-8"?>
+<file path=ppt/slides/slide6.xml><?xml version="1.0" encoding="utf-8"?>
 <p:sld xmlns:a="http://schemas.openxmlformats.org/drawingml/2006/main" xmlns:r="http://schemas.openxmlformats.org/officeDocument/2006/relationships" xmlns:p="http://schemas.openxmlformats.org/presentationml/2006/main">
   <p:cSld>
     <p:spTree>

</xml_diff>